<commit_message>
last changes to slides
</commit_message>
<xml_diff>
--- a/slides.pptx
+++ b/slides.pptx
@@ -5,37 +5,36 @@
     <p:sldMasterId id="2147493455" r:id="rId4"/>
   </p:sldMasterIdLst>
   <p:notesMasterIdLst>
-    <p:notesMasterId r:id="rId25"/>
+    <p:notesMasterId r:id="rId24"/>
   </p:notesMasterIdLst>
   <p:handoutMasterIdLst>
-    <p:handoutMasterId r:id="rId26"/>
+    <p:handoutMasterId r:id="rId25"/>
   </p:handoutMasterIdLst>
   <p:sldIdLst>
     <p:sldId id="256" r:id="rId5"/>
     <p:sldId id="257" r:id="rId6"/>
     <p:sldId id="259" r:id="rId7"/>
-    <p:sldId id="269" r:id="rId8"/>
-    <p:sldId id="267" r:id="rId9"/>
-    <p:sldId id="270" r:id="rId10"/>
-    <p:sldId id="272" r:id="rId11"/>
-    <p:sldId id="273" r:id="rId12"/>
-    <p:sldId id="271" r:id="rId13"/>
-    <p:sldId id="274" r:id="rId14"/>
-    <p:sldId id="275" r:id="rId15"/>
-    <p:sldId id="279" r:id="rId16"/>
-    <p:sldId id="278" r:id="rId17"/>
-    <p:sldId id="280" r:id="rId18"/>
-    <p:sldId id="281" r:id="rId19"/>
-    <p:sldId id="276" r:id="rId20"/>
-    <p:sldId id="277" r:id="rId21"/>
-    <p:sldId id="260" r:id="rId22"/>
-    <p:sldId id="264" r:id="rId23"/>
-    <p:sldId id="263" r:id="rId24"/>
+    <p:sldId id="267" r:id="rId8"/>
+    <p:sldId id="270" r:id="rId9"/>
+    <p:sldId id="272" r:id="rId10"/>
+    <p:sldId id="273" r:id="rId11"/>
+    <p:sldId id="271" r:id="rId12"/>
+    <p:sldId id="274" r:id="rId13"/>
+    <p:sldId id="275" r:id="rId14"/>
+    <p:sldId id="279" r:id="rId15"/>
+    <p:sldId id="278" r:id="rId16"/>
+    <p:sldId id="280" r:id="rId17"/>
+    <p:sldId id="281" r:id="rId18"/>
+    <p:sldId id="276" r:id="rId19"/>
+    <p:sldId id="277" r:id="rId20"/>
+    <p:sldId id="260" r:id="rId21"/>
+    <p:sldId id="264" r:id="rId22"/>
+    <p:sldId id="263" r:id="rId23"/>
   </p:sldIdLst>
   <p:sldSz cx="12192000" cy="6858000"/>
   <p:notesSz cx="6805613" cy="9939338"/>
   <p:custDataLst>
-    <p:tags r:id="rId27"/>
+    <p:tags r:id="rId26"/>
   </p:custDataLst>
   <p:defaultTextStyle>
     <a:defPPr>
@@ -140,10 +139,9 @@
             <p14:sldId id="256"/>
             <p14:sldId id="257"/>
             <p14:sldId id="259"/>
-            <p14:sldId id="269"/>
           </p14:sldIdLst>
         </p14:section>
-        <p14:section name="Go Introduced" id="{A326A0D1-E7E9-4042-BBF1-7B082A291B78}">
+        <p14:section name="Go introduced" id="{A326A0D1-E7E9-4042-BBF1-7B082A291B78}">
           <p14:sldIdLst>
             <p14:sldId id="267"/>
             <p14:sldId id="270"/>
@@ -153,14 +151,14 @@
             <p14:sldId id="274"/>
           </p14:sldIdLst>
         </p14:section>
-        <p14:section name="Microservice Basics" id="{58AA4FA3-AE19-4FD2-92C0-2B76B58DD6BC}">
+        <p14:section name="Microservice basics" id="{58AA4FA3-AE19-4FD2-92C0-2B76B58DD6BC}">
           <p14:sldIdLst>
             <p14:sldId id="275"/>
             <p14:sldId id="279"/>
             <p14:sldId id="278"/>
           </p14:sldIdLst>
         </p14:section>
-        <p14:section name="Implement" id="{7014F730-3337-4C72-85B6-DA909950A57F}">
+        <p14:section name="Implement a go service" id="{7014F730-3337-4C72-85B6-DA909950A57F}">
           <p14:sldIdLst>
             <p14:sldId id="280"/>
             <p14:sldId id="281"/>
@@ -277,7 +275,7 @@
 <file path=ppt/revisionInfo.xml><?xml version="1.0" encoding="utf-8"?>
 <p1510:revInfo xmlns:a="http://schemas.openxmlformats.org/drawingml/2006/main" xmlns:r="http://schemas.openxmlformats.org/officeDocument/2006/relationships" xmlns:p1510="http://schemas.microsoft.com/office/powerpoint/2015/10/main">
   <p1510:revLst>
-    <p1510:client id="{BAA8CB93-72AF-4B7A-B805-8FA3DC21B429}" v="49" dt="2021-03-16T14:42:06.449"/>
+    <p1510:client id="{BAA8CB93-72AF-4B7A-B805-8FA3DC21B429}" v="50" dt="2021-03-29T11:52:25.344"/>
   </p1510:revLst>
 </p1510:revInfo>
 </file>
@@ -287,7 +285,7 @@
   <pc:docChgLst>
     <pc:chgData name="Jochen Grün (ISO)" userId="88af28a8-8d87-4808-ab0d-95c5adee42cd" providerId="ADAL" clId="{BAA8CB93-72AF-4B7A-B805-8FA3DC21B429}"/>
     <pc:docChg chg="undo custSel addSld delSld modSld sldOrd addSection delSection modSection">
-      <pc:chgData name="Jochen Grün (ISO)" userId="88af28a8-8d87-4808-ab0d-95c5adee42cd" providerId="ADAL" clId="{BAA8CB93-72AF-4B7A-B805-8FA3DC21B429}" dt="2021-03-16T14:50:40.235" v="4720" actId="20577"/>
+      <pc:chgData name="Jochen Grün (ISO)" userId="88af28a8-8d87-4808-ab0d-95c5adee42cd" providerId="ADAL" clId="{BAA8CB93-72AF-4B7A-B805-8FA3DC21B429}" dt="2021-03-29T11:53:17.586" v="4881" actId="20577"/>
       <pc:docMkLst>
         <pc:docMk/>
       </pc:docMkLst>
@@ -323,13 +321,13 @@
         </pc:spChg>
       </pc:sldChg>
       <pc:sldChg chg="modSp mod">
-        <pc:chgData name="Jochen Grün (ISO)" userId="88af28a8-8d87-4808-ab0d-95c5adee42cd" providerId="ADAL" clId="{BAA8CB93-72AF-4B7A-B805-8FA3DC21B429}" dt="2021-03-09T08:54:53.082" v="87" actId="20577"/>
+        <pc:chgData name="Jochen Grün (ISO)" userId="88af28a8-8d87-4808-ab0d-95c5adee42cd" providerId="ADAL" clId="{BAA8CB93-72AF-4B7A-B805-8FA3DC21B429}" dt="2021-03-29T08:08:33.269" v="4793" actId="6549"/>
         <pc:sldMkLst>
           <pc:docMk/>
           <pc:sldMk cId="4046527789" sldId="259"/>
         </pc:sldMkLst>
         <pc:spChg chg="mod">
-          <ac:chgData name="Jochen Grün (ISO)" userId="88af28a8-8d87-4808-ab0d-95c5adee42cd" providerId="ADAL" clId="{BAA8CB93-72AF-4B7A-B805-8FA3DC21B429}" dt="2021-03-09T08:54:53.082" v="87" actId="20577"/>
+          <ac:chgData name="Jochen Grün (ISO)" userId="88af28a8-8d87-4808-ab0d-95c5adee42cd" providerId="ADAL" clId="{BAA8CB93-72AF-4B7A-B805-8FA3DC21B429}" dt="2021-03-29T08:08:33.269" v="4793" actId="6549"/>
           <ac:spMkLst>
             <pc:docMk/>
             <pc:sldMk cId="4046527789" sldId="259"/>
@@ -395,8 +393,8 @@
           <pc:sldMk cId="2536871133" sldId="268"/>
         </pc:sldMkLst>
       </pc:sldChg>
-      <pc:sldChg chg="modSp new mod">
-        <pc:chgData name="Jochen Grün (ISO)" userId="88af28a8-8d87-4808-ab0d-95c5adee42cd" providerId="ADAL" clId="{BAA8CB93-72AF-4B7A-B805-8FA3DC21B429}" dt="2021-03-10T06:58:38.095" v="796" actId="20577"/>
+      <pc:sldChg chg="modSp new del mod">
+        <pc:chgData name="Jochen Grün (ISO)" userId="88af28a8-8d87-4808-ab0d-95c5adee42cd" providerId="ADAL" clId="{BAA8CB93-72AF-4B7A-B805-8FA3DC21B429}" dt="2021-03-29T10:23:07.665" v="4797" actId="47"/>
         <pc:sldMkLst>
           <pc:docMk/>
           <pc:sldMk cId="3037371977" sldId="269"/>
@@ -458,13 +456,13 @@
         </pc:picChg>
       </pc:sldChg>
       <pc:sldChg chg="modSp new mod">
-        <pc:chgData name="Jochen Grün (ISO)" userId="88af28a8-8d87-4808-ab0d-95c5adee42cd" providerId="ADAL" clId="{BAA8CB93-72AF-4B7A-B805-8FA3DC21B429}" dt="2021-03-15T06:03:54.891" v="3956" actId="20577"/>
+        <pc:chgData name="Jochen Grün (ISO)" userId="88af28a8-8d87-4808-ab0d-95c5adee42cd" providerId="ADAL" clId="{BAA8CB93-72AF-4B7A-B805-8FA3DC21B429}" dt="2021-03-29T11:53:17.586" v="4881" actId="20577"/>
         <pc:sldMkLst>
           <pc:docMk/>
           <pc:sldMk cId="2700646792" sldId="271"/>
         </pc:sldMkLst>
         <pc:spChg chg="mod">
-          <ac:chgData name="Jochen Grün (ISO)" userId="88af28a8-8d87-4808-ab0d-95c5adee42cd" providerId="ADAL" clId="{BAA8CB93-72AF-4B7A-B805-8FA3DC21B429}" dt="2021-03-15T06:03:54.891" v="3956" actId="20577"/>
+          <ac:chgData name="Jochen Grün (ISO)" userId="88af28a8-8d87-4808-ab0d-95c5adee42cd" providerId="ADAL" clId="{BAA8CB93-72AF-4B7A-B805-8FA3DC21B429}" dt="2021-03-29T11:53:17.586" v="4881" actId="20577"/>
           <ac:spMkLst>
             <pc:docMk/>
             <pc:sldMk cId="2700646792" sldId="271"/>
@@ -2132,7 +2130,7 @@
                   <a:schemeClr val="tx2"/>
                 </a:solidFill>
               </a:rPr>
-              <a:t>16.03.2021</a:t>
+              <a:t>29.03.2021</a:t>
             </a:fld>
             <a:endParaRPr lang="de-DE" sz="1000">
               <a:solidFill>
@@ -2322,7 +2320,7 @@
             <a:fld id="{DF4666C0-FA6C-45BA-BD66-E1C9FC5B12A8}" type="datetimeFigureOut">
               <a:rPr lang="de-DE" smtClean="0"/>
               <a:pPr/>
-              <a:t>16.03.2021</a:t>
+              <a:t>29.03.2021</a:t>
             </a:fld>
             <a:endParaRPr lang="de-DE" dirty="0"/>
           </a:p>
@@ -2833,7 +2831,7 @@
             <a:fld id="{E5799BF5-2177-414B-8A81-41618E50EDB1}" type="slidenum">
               <a:rPr lang="de-DE" smtClean="0"/>
               <a:pPr/>
-              <a:t>19</a:t>
+              <a:t>18</a:t>
             </a:fld>
             <a:endParaRPr lang="de-DE"/>
           </a:p>
@@ -2923,7 +2921,7 @@
             <a:fld id="{E5799BF5-2177-414B-8A81-41618E50EDB1}" type="slidenum">
               <a:rPr lang="de-DE" smtClean="0"/>
               <a:pPr/>
-              <a:t>20</a:t>
+              <a:t>19</a:t>
             </a:fld>
             <a:endParaRPr lang="de-DE"/>
           </a:p>
@@ -3193,7 +3191,7 @@
             <a:fld id="{E5799BF5-2177-414B-8A81-41618E50EDB1}" type="slidenum">
               <a:rPr lang="de-DE" smtClean="0"/>
               <a:pPr/>
-              <a:t>5</a:t>
+              <a:t>4</a:t>
             </a:fld>
             <a:endParaRPr lang="de-DE" dirty="0"/>
           </a:p>
@@ -3283,7 +3281,7 @@
             <a:fld id="{E5799BF5-2177-414B-8A81-41618E50EDB1}" type="slidenum">
               <a:rPr lang="de-DE" smtClean="0"/>
               <a:pPr/>
-              <a:t>11</a:t>
+              <a:t>10</a:t>
             </a:fld>
             <a:endParaRPr lang="de-DE" dirty="0"/>
           </a:p>
@@ -3373,7 +3371,7 @@
             <a:fld id="{E5799BF5-2177-414B-8A81-41618E50EDB1}" type="slidenum">
               <a:rPr lang="de-DE" smtClean="0"/>
               <a:pPr/>
-              <a:t>13</a:t>
+              <a:t>12</a:t>
             </a:fld>
             <a:endParaRPr lang="de-DE" dirty="0"/>
           </a:p>
@@ -3463,7 +3461,7 @@
             <a:fld id="{E5799BF5-2177-414B-8A81-41618E50EDB1}" type="slidenum">
               <a:rPr lang="de-DE" smtClean="0"/>
               <a:pPr/>
-              <a:t>16</a:t>
+              <a:t>15</a:t>
             </a:fld>
             <a:endParaRPr lang="de-DE" dirty="0"/>
           </a:p>
@@ -3553,7 +3551,7 @@
             <a:fld id="{E5799BF5-2177-414B-8A81-41618E50EDB1}" type="slidenum">
               <a:rPr lang="de-DE" smtClean="0"/>
               <a:pPr/>
-              <a:t>17</a:t>
+              <a:t>16</a:t>
             </a:fld>
             <a:endParaRPr lang="de-DE" dirty="0"/>
           </a:p>
@@ -3643,7 +3641,7 @@
             <a:fld id="{E5799BF5-2177-414B-8A81-41618E50EDB1}" type="slidenum">
               <a:rPr lang="de-DE" smtClean="0"/>
               <a:pPr/>
-              <a:t>18</a:t>
+              <a:t>17</a:t>
             </a:fld>
             <a:endParaRPr lang="de-DE"/>
           </a:p>
@@ -3805,7 +3803,7 @@
           <a:p>
             <a:fld id="{F7F33227-FED5-457F-81D4-E74627327F01}" type="datetime1">
               <a:rPr lang="de-DE" smtClean="0"/>
-              <a:t>16.03.2021</a:t>
+              <a:t>29.03.2021</a:t>
             </a:fld>
             <a:endParaRPr lang="en-US" dirty="0"/>
           </a:p>
@@ -9344,7 +9342,7 @@
           <a:p>
             <a:fld id="{E740B768-3BC9-4C97-A6B2-165F9F8CFA33}" type="datetime1">
               <a:rPr lang="de-DE" smtClean="0"/>
-              <a:t>16.03.2021</a:t>
+              <a:t>29.03.2021</a:t>
             </a:fld>
             <a:endParaRPr lang="en-US" dirty="0"/>
           </a:p>
@@ -9615,7 +9613,7 @@
           <a:p>
             <a:fld id="{580D19AA-D213-4663-986A-6800CEE1CA58}" type="datetime1">
               <a:rPr lang="de-DE" smtClean="0"/>
-              <a:t>16.03.2021</a:t>
+              <a:t>29.03.2021</a:t>
             </a:fld>
             <a:endParaRPr lang="en-US" dirty="0"/>
           </a:p>
@@ -9807,7 +9805,7 @@
           <a:p>
             <a:fld id="{A8C686B1-BBF4-448D-A459-6412932910CD}" type="datetime1">
               <a:rPr lang="de-DE" smtClean="0"/>
-              <a:t>16.03.2021</a:t>
+              <a:t>29.03.2021</a:t>
             </a:fld>
             <a:endParaRPr lang="en-US" dirty="0"/>
           </a:p>
@@ -10079,7 +10077,7 @@
           <a:p>
             <a:fld id="{A8C686B1-BBF4-448D-A459-6412932910CD}" type="datetime1">
               <a:rPr lang="de-DE" smtClean="0"/>
-              <a:t>16.03.2021</a:t>
+              <a:t>29.03.2021</a:t>
             </a:fld>
             <a:endParaRPr lang="en-US" dirty="0"/>
           </a:p>
@@ -10647,7 +10645,7 @@
           <a:p>
             <a:fld id="{681A5632-900B-4722-96B8-2E655D6B8254}" type="datetime1">
               <a:rPr lang="de-DE" smtClean="0"/>
-              <a:t>16.03.2021</a:t>
+              <a:t>29.03.2021</a:t>
             </a:fld>
             <a:endParaRPr lang="en-US" dirty="0"/>
           </a:p>
@@ -11268,7 +11266,7 @@
           <a:p>
             <a:fld id="{CCB24A32-4369-497F-8A79-128AF69675CB}" type="datetime1">
               <a:rPr lang="de-DE" smtClean="0"/>
-              <a:t>16.03.2021</a:t>
+              <a:t>29.03.2021</a:t>
             </a:fld>
             <a:endParaRPr lang="en-US" dirty="0"/>
           </a:p>
@@ -11390,7 +11388,7 @@
           <a:p>
             <a:fld id="{881A3782-5D6E-47EF-94E3-C7FB9A29F086}" type="datetime1">
               <a:rPr lang="de-DE" smtClean="0"/>
-              <a:t>16.03.2021</a:t>
+              <a:t>29.03.2021</a:t>
             </a:fld>
             <a:endParaRPr lang="en-US" dirty="0"/>
           </a:p>
@@ -11570,7 +11568,7 @@
           <a:p>
             <a:fld id="{3CAC8B5F-4DA7-47D2-B58A-1D9542AC3787}" type="datetime1">
               <a:rPr lang="de-DE" smtClean="0"/>
-              <a:t>16.03.2021</a:t>
+              <a:t>29.03.2021</a:t>
             </a:fld>
             <a:endParaRPr lang="en-US" dirty="0"/>
           </a:p>
@@ -11760,7 +11758,7 @@
           <a:p>
             <a:fld id="{3CAC8B5F-4DA7-47D2-B58A-1D9542AC3787}" type="datetime1">
               <a:rPr lang="de-DE" smtClean="0"/>
-              <a:t>16.03.2021</a:t>
+              <a:t>29.03.2021</a:t>
             </a:fld>
             <a:endParaRPr lang="en-US" dirty="0"/>
           </a:p>
@@ -14240,7 +14238,7 @@
           <a:p>
             <a:fld id="{263FF8A2-96C4-4851-94C8-79373C3EF5E8}" type="datetime1">
               <a:rPr lang="de-DE" smtClean="0"/>
-              <a:t>16.03.2021</a:t>
+              <a:t>29.03.2021</a:t>
             </a:fld>
             <a:endParaRPr lang="en-US" dirty="0"/>
           </a:p>
@@ -14912,7 +14910,7 @@
           <a:p>
             <a:fld id="{0A53F34A-1776-4CF9-A7B7-801786891889}" type="datetime1">
               <a:rPr lang="de-DE" smtClean="0"/>
-              <a:t>16.03.2021</a:t>
+              <a:t>29.03.2021</a:t>
             </a:fld>
             <a:endParaRPr lang="en-US" dirty="0"/>
           </a:p>
@@ -18959,7 +18957,7 @@
           <a:p>
             <a:fld id="{0A53F34A-1776-4CF9-A7B7-801786891889}" type="datetime1">
               <a:rPr lang="de-DE" smtClean="0"/>
-              <a:t>16.03.2021</a:t>
+              <a:t>29.03.2021</a:t>
             </a:fld>
             <a:endParaRPr lang="en-US" dirty="0"/>
           </a:p>
@@ -22656,7 +22654,7 @@
             <a:fld id="{211F924D-D0F0-48B3-AB8A-6E39FBD75350}" type="datetime1">
               <a:rPr lang="de-DE" smtClean="0"/>
               <a:pPr/>
-              <a:t>16.03.2021</a:t>
+              <a:t>29.03.2021</a:t>
             </a:fld>
             <a:endParaRPr lang="en-US" dirty="0"/>
           </a:p>
@@ -22955,7 +22953,7 @@
           <a:p>
             <a:fld id="{43CE7C91-877C-44D6-9892-950E5E0626D1}" type="datetime1">
               <a:rPr lang="de-DE" smtClean="0"/>
-              <a:t>16.03.2021</a:t>
+              <a:t>29.03.2021</a:t>
             </a:fld>
             <a:endParaRPr lang="en-US" dirty="0"/>
           </a:p>
@@ -23153,7 +23151,7 @@
           <a:p>
             <a:fld id="{E243A558-6A64-40D2-ABA5-CC0024ABAEAB}" type="datetime1">
               <a:rPr lang="de-DE" smtClean="0"/>
-              <a:t>16.03.2021</a:t>
+              <a:t>29.03.2021</a:t>
             </a:fld>
             <a:endParaRPr lang="en-US" dirty="0"/>
           </a:p>
@@ -23538,7 +23536,7 @@
           <a:p>
             <a:fld id="{85F3669E-AC4A-4E81-AD65-5336D3B883ED}" type="datetime1">
               <a:rPr lang="de-DE" smtClean="0"/>
-              <a:t>16.03.2021</a:t>
+              <a:t>29.03.2021</a:t>
             </a:fld>
             <a:endParaRPr lang="en-US" dirty="0"/>
           </a:p>
@@ -25653,7 +25651,7 @@
             <a:fld id="{211F924D-D0F0-48B3-AB8A-6E39FBD75350}" type="datetime1">
               <a:rPr lang="de-DE" smtClean="0"/>
               <a:pPr/>
-              <a:t>16.03.2021</a:t>
+              <a:t>29.03.2021</a:t>
             </a:fld>
             <a:endParaRPr lang="en-US" dirty="0"/>
           </a:p>
@@ -29895,662 +29893,6 @@
       </p:grpSpPr>
       <p:sp>
         <p:nvSpPr>
-          <p:cNvPr id="2" name="Textplatzhalter 1">
-            <a:extLst>
-              <a:ext uri="{FF2B5EF4-FFF2-40B4-BE49-F238E27FC236}">
-                <a16:creationId xmlns:a16="http://schemas.microsoft.com/office/drawing/2014/main" id="{83208DC2-F530-4691-9476-F2E42EA0176A}"/>
-              </a:ext>
-            </a:extLst>
-          </p:cNvPr>
-          <p:cNvSpPr>
-            <a:spLocks noGrp="1"/>
-          </p:cNvSpPr>
-          <p:nvPr>
-            <p:ph type="body" sz="quarter" idx="22"/>
-          </p:nvPr>
-        </p:nvSpPr>
-        <p:spPr/>
-        <p:txBody>
-          <a:bodyPr/>
-          <a:lstStyle/>
-          <a:p>
-            <a:pPr lvl="1"/>
-            <a:r>
-              <a:rPr lang="de-DE" dirty="0" err="1"/>
-              <a:t>test</a:t>
-            </a:r>
-            <a:r>
-              <a:rPr lang="de-DE" dirty="0"/>
-              <a:t> </a:t>
-            </a:r>
-            <a:r>
-              <a:rPr lang="de-DE" dirty="0" err="1"/>
-              <a:t>files</a:t>
-            </a:r>
-            <a:r>
-              <a:rPr lang="de-DE" dirty="0"/>
-              <a:t> </a:t>
-            </a:r>
-            <a:r>
-              <a:rPr lang="de-DE" dirty="0" err="1"/>
-              <a:t>are</a:t>
-            </a:r>
-            <a:r>
-              <a:rPr lang="de-DE" dirty="0"/>
-              <a:t> </a:t>
-            </a:r>
-            <a:r>
-              <a:rPr lang="de-DE" dirty="0" err="1"/>
-              <a:t>placed</a:t>
-            </a:r>
-            <a:r>
-              <a:rPr lang="de-DE" dirty="0"/>
-              <a:t> </a:t>
-            </a:r>
-            <a:r>
-              <a:rPr lang="de-DE" dirty="0" err="1"/>
-              <a:t>side-by-side</a:t>
-            </a:r>
-            <a:r>
-              <a:rPr lang="de-DE" dirty="0"/>
-              <a:t> </a:t>
-            </a:r>
-            <a:r>
-              <a:rPr lang="de-DE" dirty="0" err="1"/>
-              <a:t>with</a:t>
-            </a:r>
-            <a:r>
-              <a:rPr lang="de-DE" dirty="0"/>
-              <a:t> code </a:t>
-            </a:r>
-            <a:r>
-              <a:rPr lang="de-DE" dirty="0" err="1"/>
-              <a:t>files</a:t>
-            </a:r>
-            <a:endParaRPr lang="de-DE" dirty="0"/>
-          </a:p>
-          <a:p>
-            <a:pPr lvl="1"/>
-            <a:r>
-              <a:rPr lang="de-DE" dirty="0"/>
-              <a:t>simple </a:t>
-            </a:r>
-            <a:r>
-              <a:rPr lang="de-DE" dirty="0" err="1"/>
-              <a:t>naming</a:t>
-            </a:r>
-            <a:r>
-              <a:rPr lang="de-DE" dirty="0"/>
-              <a:t> </a:t>
-            </a:r>
-            <a:r>
-              <a:rPr lang="de-DE" dirty="0" err="1"/>
-              <a:t>convention</a:t>
-            </a:r>
-            <a:endParaRPr lang="de-DE" dirty="0"/>
-          </a:p>
-          <a:p>
-            <a:pPr lvl="2"/>
-            <a:r>
-              <a:rPr lang="de-DE" dirty="0"/>
-              <a:t>all </a:t>
-            </a:r>
-            <a:r>
-              <a:rPr lang="de-DE" dirty="0" err="1"/>
-              <a:t>files</a:t>
-            </a:r>
-            <a:r>
-              <a:rPr lang="de-DE" dirty="0"/>
-              <a:t> </a:t>
-            </a:r>
-            <a:r>
-              <a:rPr lang="de-DE" dirty="0" err="1"/>
-              <a:t>matching</a:t>
-            </a:r>
-            <a:r>
-              <a:rPr lang="de-DE" dirty="0"/>
-              <a:t> *_</a:t>
-            </a:r>
-            <a:r>
-              <a:rPr lang="de-DE" dirty="0" err="1"/>
-              <a:t>test.go</a:t>
-            </a:r>
-            <a:r>
-              <a:rPr lang="de-DE" dirty="0"/>
-              <a:t> </a:t>
-            </a:r>
-            <a:r>
-              <a:rPr lang="de-DE" dirty="0" err="1"/>
-              <a:t>are</a:t>
-            </a:r>
-            <a:r>
-              <a:rPr lang="de-DE" dirty="0"/>
-              <a:t> </a:t>
-            </a:r>
-            <a:r>
-              <a:rPr lang="de-DE" dirty="0" err="1"/>
-              <a:t>regarded</a:t>
-            </a:r>
-            <a:r>
-              <a:rPr lang="de-DE" dirty="0"/>
-              <a:t> </a:t>
-            </a:r>
-            <a:r>
-              <a:rPr lang="de-DE" dirty="0" err="1"/>
-              <a:t>as</a:t>
-            </a:r>
-            <a:r>
-              <a:rPr lang="de-DE" dirty="0"/>
-              <a:t> </a:t>
-            </a:r>
-            <a:r>
-              <a:rPr lang="de-DE" dirty="0" err="1"/>
-              <a:t>test</a:t>
-            </a:r>
-            <a:r>
-              <a:rPr lang="de-DE" dirty="0"/>
-              <a:t> </a:t>
-            </a:r>
-            <a:r>
-              <a:rPr lang="de-DE" dirty="0" err="1"/>
-              <a:t>files</a:t>
-            </a:r>
-            <a:endParaRPr lang="de-DE" dirty="0"/>
-          </a:p>
-          <a:p>
-            <a:pPr lvl="2"/>
-            <a:r>
-              <a:rPr lang="de-DE" dirty="0"/>
-              <a:t>all </a:t>
-            </a:r>
-            <a:r>
-              <a:rPr lang="de-DE" dirty="0" err="1"/>
-              <a:t>functions</a:t>
-            </a:r>
-            <a:r>
-              <a:rPr lang="de-DE" dirty="0"/>
-              <a:t> </a:t>
-            </a:r>
-            <a:r>
-              <a:rPr lang="de-DE" dirty="0" err="1"/>
-              <a:t>starting</a:t>
-            </a:r>
-            <a:r>
-              <a:rPr lang="de-DE" dirty="0"/>
-              <a:t> </a:t>
-            </a:r>
-            <a:r>
-              <a:rPr lang="de-DE" dirty="0" err="1"/>
-              <a:t>with</a:t>
-            </a:r>
-            <a:r>
-              <a:rPr lang="de-DE" dirty="0"/>
-              <a:t> Test… </a:t>
-            </a:r>
-            <a:r>
-              <a:rPr lang="de-DE" dirty="0" err="1"/>
-              <a:t>are</a:t>
-            </a:r>
-            <a:r>
-              <a:rPr lang="de-DE" dirty="0"/>
-              <a:t> </a:t>
-            </a:r>
-            <a:r>
-              <a:rPr lang="de-DE" dirty="0" err="1"/>
-              <a:t>regarded</a:t>
-            </a:r>
-            <a:r>
-              <a:rPr lang="de-DE" dirty="0"/>
-              <a:t> </a:t>
-            </a:r>
-            <a:r>
-              <a:rPr lang="de-DE" dirty="0" err="1"/>
-              <a:t>as</a:t>
-            </a:r>
-            <a:r>
-              <a:rPr lang="de-DE" dirty="0"/>
-              <a:t> </a:t>
-            </a:r>
-            <a:r>
-              <a:rPr lang="de-DE" dirty="0" err="1"/>
-              <a:t>test</a:t>
-            </a:r>
-            <a:r>
-              <a:rPr lang="de-DE" dirty="0"/>
-              <a:t> </a:t>
-            </a:r>
-            <a:r>
-              <a:rPr lang="de-DE" dirty="0" err="1"/>
-              <a:t>cases</a:t>
-            </a:r>
-            <a:endParaRPr lang="de-DE" dirty="0"/>
-          </a:p>
-          <a:p>
-            <a:pPr lvl="1"/>
-            <a:r>
-              <a:rPr lang="de-DE" dirty="0" err="1"/>
-              <a:t>each</a:t>
-            </a:r>
-            <a:r>
-              <a:rPr lang="de-DE" dirty="0"/>
-              <a:t> </a:t>
-            </a:r>
-            <a:r>
-              <a:rPr lang="de-DE" dirty="0" err="1"/>
-              <a:t>test</a:t>
-            </a:r>
-            <a:r>
-              <a:rPr lang="de-DE" dirty="0"/>
-              <a:t> </a:t>
-            </a:r>
-            <a:r>
-              <a:rPr lang="de-DE" dirty="0" err="1"/>
-              <a:t>case</a:t>
-            </a:r>
-            <a:r>
-              <a:rPr lang="de-DE" dirty="0"/>
-              <a:t> </a:t>
-            </a:r>
-            <a:r>
-              <a:rPr lang="de-DE" dirty="0" err="1"/>
-              <a:t>function</a:t>
-            </a:r>
-            <a:r>
-              <a:rPr lang="de-DE" dirty="0"/>
-              <a:t> </a:t>
-            </a:r>
-            <a:r>
-              <a:rPr lang="de-DE" dirty="0" err="1"/>
-              <a:t>receives</a:t>
-            </a:r>
-            <a:r>
-              <a:rPr lang="de-DE" dirty="0"/>
-              <a:t> a </a:t>
-            </a:r>
-            <a:r>
-              <a:rPr lang="de-DE" dirty="0" err="1"/>
-              <a:t>test</a:t>
-            </a:r>
-            <a:r>
-              <a:rPr lang="de-DE" dirty="0"/>
-              <a:t> </a:t>
-            </a:r>
-            <a:r>
-              <a:rPr lang="de-DE" dirty="0" err="1"/>
-              <a:t>context</a:t>
-            </a:r>
-            <a:r>
-              <a:rPr lang="de-DE" dirty="0"/>
-              <a:t> </a:t>
-            </a:r>
-            <a:r>
-              <a:rPr lang="de-DE" dirty="0" err="1"/>
-              <a:t>as</a:t>
-            </a:r>
-            <a:r>
-              <a:rPr lang="de-DE" dirty="0"/>
-              <a:t> </a:t>
-            </a:r>
-            <a:r>
-              <a:rPr lang="de-DE" dirty="0" err="1"/>
-              <a:t>parameter</a:t>
-            </a:r>
-            <a:endParaRPr lang="de-DE" dirty="0"/>
-          </a:p>
-          <a:p>
-            <a:pPr lvl="1"/>
-            <a:r>
-              <a:rPr lang="de-DE" dirty="0" err="1"/>
-              <a:t>test</a:t>
-            </a:r>
-            <a:r>
-              <a:rPr lang="de-DE" dirty="0"/>
-              <a:t> </a:t>
-            </a:r>
-            <a:r>
-              <a:rPr lang="de-DE" dirty="0" err="1"/>
-              <a:t>context</a:t>
-            </a:r>
-            <a:r>
-              <a:rPr lang="de-DE" dirty="0"/>
-              <a:t> </a:t>
-            </a:r>
-            <a:r>
-              <a:rPr lang="de-DE" dirty="0" err="1"/>
-              <a:t>can</a:t>
-            </a:r>
-            <a:r>
-              <a:rPr lang="de-DE" dirty="0"/>
-              <a:t> </a:t>
-            </a:r>
-            <a:r>
-              <a:rPr lang="de-DE" dirty="0" err="1"/>
-              <a:t>be</a:t>
-            </a:r>
-            <a:r>
-              <a:rPr lang="de-DE" dirty="0"/>
-              <a:t> </a:t>
-            </a:r>
-            <a:r>
-              <a:rPr lang="de-DE" dirty="0" err="1"/>
-              <a:t>used</a:t>
-            </a:r>
-            <a:r>
-              <a:rPr lang="de-DE" dirty="0"/>
-              <a:t> </a:t>
-            </a:r>
-            <a:r>
-              <a:rPr lang="de-DE" dirty="0" err="1"/>
-              <a:t>for</a:t>
-            </a:r>
-            <a:r>
-              <a:rPr lang="de-DE" dirty="0"/>
-              <a:t> </a:t>
-            </a:r>
-            <a:r>
-              <a:rPr lang="de-DE" dirty="0" err="1"/>
-              <a:t>logging</a:t>
-            </a:r>
-            <a:r>
-              <a:rPr lang="de-DE" dirty="0"/>
-              <a:t> </a:t>
-            </a:r>
-            <a:r>
-              <a:rPr lang="de-DE" dirty="0" err="1"/>
-              <a:t>or</a:t>
-            </a:r>
-            <a:r>
-              <a:rPr lang="de-DE" dirty="0"/>
-              <a:t> </a:t>
-            </a:r>
-            <a:r>
-              <a:rPr lang="de-DE" dirty="0" err="1"/>
-              <a:t>writing</a:t>
-            </a:r>
-            <a:r>
-              <a:rPr lang="de-DE" dirty="0"/>
-              <a:t> </a:t>
-            </a:r>
-            <a:r>
-              <a:rPr lang="de-DE" dirty="0" err="1"/>
-              <a:t>asserts</a:t>
-            </a:r>
-            <a:endParaRPr lang="de-DE" dirty="0"/>
-          </a:p>
-          <a:p>
-            <a:pPr lvl="1"/>
-            <a:r>
-              <a:rPr lang="de-DE" dirty="0" err="1"/>
-              <a:t>test</a:t>
-            </a:r>
-            <a:r>
-              <a:rPr lang="de-DE" dirty="0"/>
-              <a:t> code </a:t>
-            </a:r>
-            <a:r>
-              <a:rPr lang="de-DE" dirty="0" err="1"/>
-              <a:t>is</a:t>
-            </a:r>
-            <a:r>
-              <a:rPr lang="de-DE" dirty="0"/>
-              <a:t> not </a:t>
-            </a:r>
-            <a:r>
-              <a:rPr lang="de-DE" dirty="0" err="1"/>
-              <a:t>compiled</a:t>
-            </a:r>
-            <a:r>
-              <a:rPr lang="de-DE" dirty="0"/>
-              <a:t> </a:t>
-            </a:r>
-            <a:r>
-              <a:rPr lang="de-DE" dirty="0" err="1"/>
-              <a:t>into</a:t>
-            </a:r>
-            <a:r>
-              <a:rPr lang="de-DE" dirty="0"/>
-              <a:t> </a:t>
-            </a:r>
-            <a:r>
-              <a:rPr lang="de-DE" dirty="0" err="1"/>
-              <a:t>executable</a:t>
-            </a:r>
-            <a:r>
-              <a:rPr lang="de-DE" dirty="0"/>
-              <a:t> </a:t>
-            </a:r>
-            <a:r>
-              <a:rPr lang="de-DE" dirty="0" err="1"/>
-              <a:t>binaries</a:t>
-            </a:r>
-            <a:endParaRPr lang="de-DE" dirty="0"/>
-          </a:p>
-          <a:p>
-            <a:pPr lvl="1"/>
-            <a:endParaRPr lang="de-DE" dirty="0"/>
-          </a:p>
-        </p:txBody>
-      </p:sp>
-      <p:sp>
-        <p:nvSpPr>
-          <p:cNvPr id="3" name="Datumsplatzhalter 2">
-            <a:extLst>
-              <a:ext uri="{FF2B5EF4-FFF2-40B4-BE49-F238E27FC236}">
-                <a16:creationId xmlns:a16="http://schemas.microsoft.com/office/drawing/2014/main" id="{32EBC5BF-671D-4EA8-8245-A3308A329928}"/>
-              </a:ext>
-            </a:extLst>
-          </p:cNvPr>
-          <p:cNvSpPr>
-            <a:spLocks noGrp="1"/>
-          </p:cNvSpPr>
-          <p:nvPr>
-            <p:ph type="dt" sz="half" idx="23"/>
-          </p:nvPr>
-        </p:nvSpPr>
-        <p:spPr/>
-        <p:txBody>
-          <a:bodyPr/>
-          <a:lstStyle/>
-          <a:p>
-            <a:fld id="{43CE7C91-877C-44D6-9892-950E5E0626D1}" type="datetime1">
-              <a:rPr lang="de-DE" smtClean="0"/>
-              <a:t>16.03.2021</a:t>
-            </a:fld>
-            <a:endParaRPr lang="en-US" dirty="0"/>
-          </a:p>
-        </p:txBody>
-      </p:sp>
-      <p:sp>
-        <p:nvSpPr>
-          <p:cNvPr id="4" name="Fußzeilenplatzhalter 3">
-            <a:extLst>
-              <a:ext uri="{FF2B5EF4-FFF2-40B4-BE49-F238E27FC236}">
-                <a16:creationId xmlns:a16="http://schemas.microsoft.com/office/drawing/2014/main" id="{757DFC5B-DF21-4855-94BC-4CACAE702E1E}"/>
-              </a:ext>
-            </a:extLst>
-          </p:cNvPr>
-          <p:cNvSpPr>
-            <a:spLocks noGrp="1"/>
-          </p:cNvSpPr>
-          <p:nvPr>
-            <p:ph type="ftr" sz="quarter" idx="24"/>
-          </p:nvPr>
-        </p:nvSpPr>
-        <p:spPr/>
-        <p:txBody>
-          <a:bodyPr/>
-          <a:lstStyle/>
-          <a:p>
-            <a:r>
-              <a:rPr lang="de-DE"/>
-              <a:t>© MHP Management- und IT-Beratung GmbH</a:t>
-            </a:r>
-            <a:endParaRPr lang="en-US" dirty="0"/>
-          </a:p>
-        </p:txBody>
-      </p:sp>
-      <p:sp>
-        <p:nvSpPr>
-          <p:cNvPr id="5" name="Foliennummernplatzhalter 4">
-            <a:extLst>
-              <a:ext uri="{FF2B5EF4-FFF2-40B4-BE49-F238E27FC236}">
-                <a16:creationId xmlns:a16="http://schemas.microsoft.com/office/drawing/2014/main" id="{C31ABE4D-78C9-4DE3-BB99-689A809DAA6C}"/>
-              </a:ext>
-            </a:extLst>
-          </p:cNvPr>
-          <p:cNvSpPr>
-            <a:spLocks noGrp="1"/>
-          </p:cNvSpPr>
-          <p:nvPr>
-            <p:ph type="sldNum" sz="quarter" idx="25"/>
-          </p:nvPr>
-        </p:nvSpPr>
-        <p:spPr/>
-        <p:txBody>
-          <a:bodyPr/>
-          <a:lstStyle/>
-          <a:p>
-            <a:fld id="{2066355A-084C-D24E-9AD2-7E4FC41EA627}" type="slidenum">
-              <a:rPr lang="en-US" smtClean="0"/>
-              <a:pPr/>
-              <a:t>10</a:t>
-            </a:fld>
-            <a:endParaRPr lang="en-US" dirty="0"/>
-          </a:p>
-        </p:txBody>
-      </p:sp>
-      <p:sp>
-        <p:nvSpPr>
-          <p:cNvPr id="6" name="Textplatzhalter 5">
-            <a:extLst>
-              <a:ext uri="{FF2B5EF4-FFF2-40B4-BE49-F238E27FC236}">
-                <a16:creationId xmlns:a16="http://schemas.microsoft.com/office/drawing/2014/main" id="{78B71ED7-D7C6-4561-BE05-565FF9BF8C18}"/>
-              </a:ext>
-            </a:extLst>
-          </p:cNvPr>
-          <p:cNvSpPr>
-            <a:spLocks noGrp="1"/>
-          </p:cNvSpPr>
-          <p:nvPr>
-            <p:ph type="body" sz="quarter" idx="27"/>
-          </p:nvPr>
-        </p:nvSpPr>
-        <p:spPr/>
-        <p:txBody>
-          <a:bodyPr/>
-          <a:lstStyle/>
-          <a:p>
-            <a:endParaRPr lang="de-DE"/>
-          </a:p>
-        </p:txBody>
-      </p:sp>
-      <p:sp>
-        <p:nvSpPr>
-          <p:cNvPr id="7" name="Titel 6">
-            <a:extLst>
-              <a:ext uri="{FF2B5EF4-FFF2-40B4-BE49-F238E27FC236}">
-                <a16:creationId xmlns:a16="http://schemas.microsoft.com/office/drawing/2014/main" id="{45C35AED-8839-4A0E-A8C2-BF8A4BC9BD39}"/>
-              </a:ext>
-            </a:extLst>
-          </p:cNvPr>
-          <p:cNvSpPr>
-            <a:spLocks noGrp="1"/>
-          </p:cNvSpPr>
-          <p:nvPr>
-            <p:ph type="title"/>
-          </p:nvPr>
-        </p:nvSpPr>
-        <p:spPr/>
-        <p:txBody>
-          <a:bodyPr/>
-          <a:lstStyle/>
-          <a:p>
-            <a:r>
-              <a:rPr lang="de-DE" dirty="0"/>
-              <a:t>Go Unit </a:t>
-            </a:r>
-            <a:r>
-              <a:rPr lang="de-DE" dirty="0" err="1"/>
-              <a:t>Testing</a:t>
-            </a:r>
-            <a:endParaRPr lang="de-DE" dirty="0"/>
-          </a:p>
-        </p:txBody>
-      </p:sp>
-      <p:pic>
-        <p:nvPicPr>
-          <p:cNvPr id="8" name="Grafik 7">
-            <a:extLst>
-              <a:ext uri="{FF2B5EF4-FFF2-40B4-BE49-F238E27FC236}">
-                <a16:creationId xmlns:a16="http://schemas.microsoft.com/office/drawing/2014/main" id="{28481313-A05D-4A33-888C-3B769C8AAEDD}"/>
-              </a:ext>
-            </a:extLst>
-          </p:cNvPr>
-          <p:cNvPicPr>
-            <a:picLocks noChangeAspect="1"/>
-          </p:cNvPicPr>
-          <p:nvPr/>
-        </p:nvPicPr>
-        <p:blipFill>
-          <a:blip r:embed="rId2"/>
-          <a:stretch>
-            <a:fillRect/>
-          </a:stretch>
-        </p:blipFill>
-        <p:spPr>
-          <a:xfrm>
-            <a:off x="6531288" y="1614490"/>
-            <a:ext cx="3486150" cy="4191000"/>
-          </a:xfrm>
-          <a:prstGeom prst="rect">
-            <a:avLst/>
-          </a:prstGeom>
-        </p:spPr>
-      </p:pic>
-    </p:spTree>
-    <p:extLst>
-      <p:ext uri="{BB962C8B-B14F-4D97-AF65-F5344CB8AC3E}">
-        <p14:creationId xmlns:p14="http://schemas.microsoft.com/office/powerpoint/2010/main" val="2163039191"/>
-      </p:ext>
-    </p:extLst>
-  </p:cSld>
-  <p:clrMapOvr>
-    <a:masterClrMapping/>
-  </p:clrMapOvr>
-  <mc:AlternateContent xmlns:mc="http://schemas.openxmlformats.org/markup-compatibility/2006" xmlns:p14="http://schemas.microsoft.com/office/powerpoint/2010/main">
-    <mc:Choice Requires="p14">
-      <p:transition p14:dur="350">
-        <p:fade/>
-      </p:transition>
-    </mc:Choice>
-    <mc:Fallback xmlns="">
-      <p:transition xmlns:p14="http://schemas.microsoft.com/office/powerpoint/2010/main">
-        <p:fade/>
-      </p:transition>
-    </mc:Fallback>
-  </mc:AlternateContent>
-</p:sld>
-</file>
-
-<file path=ppt/slides/slide11.xml><?xml version="1.0" encoding="utf-8"?>
-<p:sld xmlns:a="http://schemas.openxmlformats.org/drawingml/2006/main" xmlns:r="http://schemas.openxmlformats.org/officeDocument/2006/relationships" xmlns:p="http://schemas.openxmlformats.org/presentationml/2006/main">
-  <p:cSld>
-    <p:spTree>
-      <p:nvGrpSpPr>
-        <p:cNvPr id="1" name=""/>
-        <p:cNvGrpSpPr/>
-        <p:nvPr/>
-      </p:nvGrpSpPr>
-      <p:grpSpPr>
-        <a:xfrm>
-          <a:off x="0" y="0"/>
-          <a:ext cx="0" cy="0"/>
-          <a:chOff x="0" y="0"/>
-          <a:chExt cx="0" cy="0"/>
-        </a:xfrm>
-      </p:grpSpPr>
-      <p:sp>
-        <p:nvSpPr>
           <p:cNvPr id="12" name="Textplatzhalter 11"/>
           <p:cNvSpPr>
             <a:spLocks noGrp="1"/>
@@ -30735,7 +30077,7 @@
             <a:fld id="{70E9AACE-BDBD-415B-8195-34948F18EBB2}" type="datetime1">
               <a:rPr lang="de-DE" smtClean="0"/>
               <a:pPr/>
-              <a:t>16.03.2021</a:t>
+              <a:t>29.03.2021</a:t>
             </a:fld>
             <a:endParaRPr lang="en-US" dirty="0"/>
           </a:p>
@@ -30782,7 +30124,7 @@
             <a:fld id="{2066355A-084C-D24E-9AD2-7E4FC41EA627}" type="slidenum">
               <a:rPr lang="en-US" smtClean="0"/>
               <a:pPr/>
-              <a:t>11</a:t>
+              <a:t>10</a:t>
             </a:fld>
             <a:endParaRPr lang="en-US" dirty="0"/>
           </a:p>
@@ -30832,7 +30174,7 @@
 </p:sld>
 </file>
 
-<file path=ppt/slides/slide12.xml><?xml version="1.0" encoding="utf-8"?>
+<file path=ppt/slides/slide11.xml><?xml version="1.0" encoding="utf-8"?>
 <p:sld xmlns:a="http://schemas.openxmlformats.org/drawingml/2006/main" xmlns:r="http://schemas.openxmlformats.org/officeDocument/2006/relationships" xmlns:p="http://schemas.openxmlformats.org/presentationml/2006/main">
   <p:cSld>
     <p:spTree>
@@ -31661,7 +31003,7 @@
           <a:p>
             <a:fld id="{43CE7C91-877C-44D6-9892-950E5E0626D1}" type="datetime1">
               <a:rPr lang="de-DE" smtClean="0"/>
-              <a:t>16.03.2021</a:t>
+              <a:t>29.03.2021</a:t>
             </a:fld>
             <a:endParaRPr lang="en-US" dirty="0"/>
           </a:p>
@@ -31720,7 +31062,7 @@
             <a:fld id="{2066355A-084C-D24E-9AD2-7E4FC41EA627}" type="slidenum">
               <a:rPr lang="en-US" smtClean="0"/>
               <a:pPr/>
-              <a:t>12</a:t>
+              <a:t>11</a:t>
             </a:fld>
             <a:endParaRPr lang="en-US" dirty="0"/>
           </a:p>
@@ -31817,7 +31159,7 @@
 </p:sld>
 </file>
 
-<file path=ppt/slides/slide13.xml><?xml version="1.0" encoding="utf-8"?>
+<file path=ppt/slides/slide12.xml><?xml version="1.0" encoding="utf-8"?>
 <p:sld xmlns:a="http://schemas.openxmlformats.org/drawingml/2006/main" xmlns:r="http://schemas.openxmlformats.org/officeDocument/2006/relationships" xmlns:p="http://schemas.openxmlformats.org/presentationml/2006/main">
   <p:cSld>
     <p:spTree>
@@ -32124,7 +31466,7 @@
             <a:fld id="{70E9AACE-BDBD-415B-8195-34948F18EBB2}" type="datetime1">
               <a:rPr lang="de-DE" smtClean="0"/>
               <a:pPr/>
-              <a:t>16.03.2021</a:t>
+              <a:t>29.03.2021</a:t>
             </a:fld>
             <a:endParaRPr lang="en-US" dirty="0"/>
           </a:p>
@@ -32171,7 +31513,7 @@
             <a:fld id="{2066355A-084C-D24E-9AD2-7E4FC41EA627}" type="slidenum">
               <a:rPr lang="en-US" smtClean="0"/>
               <a:pPr/>
-              <a:t>13</a:t>
+              <a:t>12</a:t>
             </a:fld>
             <a:endParaRPr lang="en-US" dirty="0"/>
           </a:p>
@@ -32221,7 +31563,7 @@
 </p:sld>
 </file>
 
-<file path=ppt/slides/slide14.xml><?xml version="1.0" encoding="utf-8"?>
+<file path=ppt/slides/slide13.xml><?xml version="1.0" encoding="utf-8"?>
 <p:sld xmlns:a="http://schemas.openxmlformats.org/drawingml/2006/main" xmlns:r="http://schemas.openxmlformats.org/officeDocument/2006/relationships" xmlns:p="http://schemas.openxmlformats.org/presentationml/2006/main">
   <p:cSld>
     <p:spTree>
@@ -32504,7 +31846,7 @@
           <a:p>
             <a:fld id="{43CE7C91-877C-44D6-9892-950E5E0626D1}" type="datetime1">
               <a:rPr lang="de-DE" smtClean="0"/>
-              <a:t>16.03.2021</a:t>
+              <a:t>29.03.2021</a:t>
             </a:fld>
             <a:endParaRPr lang="en-US" dirty="0"/>
           </a:p>
@@ -32563,7 +31905,7 @@
             <a:fld id="{2066355A-084C-D24E-9AD2-7E4FC41EA627}" type="slidenum">
               <a:rPr lang="en-US" smtClean="0"/>
               <a:pPr/>
-              <a:t>14</a:t>
+              <a:t>13</a:t>
             </a:fld>
             <a:endParaRPr lang="en-US" dirty="0"/>
           </a:p>
@@ -33290,7 +32632,7 @@
 </p:sld>
 </file>
 
-<file path=ppt/slides/slide15.xml><?xml version="1.0" encoding="utf-8"?>
+<file path=ppt/slides/slide14.xml><?xml version="1.0" encoding="utf-8"?>
 <p:sld xmlns:a="http://schemas.openxmlformats.org/drawingml/2006/main" xmlns:r="http://schemas.openxmlformats.org/officeDocument/2006/relationships" xmlns:p="http://schemas.openxmlformats.org/presentationml/2006/main">
   <p:cSld>
     <p:spTree>
@@ -33553,7 +32895,7 @@
           <a:p>
             <a:fld id="{43CE7C91-877C-44D6-9892-950E5E0626D1}" type="datetime1">
               <a:rPr lang="de-DE" smtClean="0"/>
-              <a:t>16.03.2021</a:t>
+              <a:t>29.03.2021</a:t>
             </a:fld>
             <a:endParaRPr lang="en-US" dirty="0"/>
           </a:p>
@@ -33612,7 +32954,7 @@
             <a:fld id="{2066355A-084C-D24E-9AD2-7E4FC41EA627}" type="slidenum">
               <a:rPr lang="en-US" smtClean="0"/>
               <a:pPr/>
-              <a:t>15</a:t>
+              <a:t>14</a:t>
             </a:fld>
             <a:endParaRPr lang="en-US" dirty="0"/>
           </a:p>
@@ -33701,7 +33043,7 @@
 </p:sld>
 </file>
 
-<file path=ppt/slides/slide16.xml><?xml version="1.0" encoding="utf-8"?>
+<file path=ppt/slides/slide15.xml><?xml version="1.0" encoding="utf-8"?>
 <p:sld xmlns:a="http://schemas.openxmlformats.org/drawingml/2006/main" xmlns:r="http://schemas.openxmlformats.org/officeDocument/2006/relationships" xmlns:p="http://schemas.openxmlformats.org/presentationml/2006/main">
   <p:cSld>
     <p:spTree>
@@ -33754,7 +33096,7 @@
           <a:p>
             <a:fld id="{69CC3902-11E9-4604-A25A-87DD319CFE3C}" type="datetime1">
               <a:rPr lang="de-DE" smtClean="0"/>
-              <a:t>16.03.2021</a:t>
+              <a:t>29.03.2021</a:t>
             </a:fld>
             <a:endParaRPr lang="en-US" dirty="0"/>
           </a:p>
@@ -33801,7 +33143,7 @@
             <a:fld id="{2066355A-084C-D24E-9AD2-7E4FC41EA627}" type="slidenum">
               <a:rPr lang="en-US" smtClean="0"/>
               <a:pPr/>
-              <a:t>16</a:t>
+              <a:t>15</a:t>
             </a:fld>
             <a:endParaRPr lang="en-US" dirty="0"/>
           </a:p>
@@ -33832,7 +33174,7 @@
 </p:sld>
 </file>
 
-<file path=ppt/slides/slide17.xml><?xml version="1.0" encoding="utf-8"?>
+<file path=ppt/slides/slide16.xml><?xml version="1.0" encoding="utf-8"?>
 <p:sld xmlns:a="http://schemas.openxmlformats.org/drawingml/2006/main" xmlns:r="http://schemas.openxmlformats.org/officeDocument/2006/relationships" xmlns:p="http://schemas.openxmlformats.org/presentationml/2006/main">
   <p:cSld>
     <p:spTree>
@@ -33891,7 +33233,7 @@
           <a:p>
             <a:fld id="{B7BDF064-C1FF-4E75-B351-6E9EC2C551E0}" type="datetime1">
               <a:rPr lang="de-DE" smtClean="0"/>
-              <a:t>16.03.2021</a:t>
+              <a:t>29.03.2021</a:t>
             </a:fld>
             <a:endParaRPr lang="en-US" dirty="0"/>
           </a:p>
@@ -33938,7 +33280,7 @@
             <a:fld id="{2066355A-084C-D24E-9AD2-7E4FC41EA627}" type="slidenum">
               <a:rPr lang="en-US" smtClean="0"/>
               <a:pPr/>
-              <a:t>17</a:t>
+              <a:t>16</a:t>
             </a:fld>
             <a:endParaRPr lang="en-US" dirty="0"/>
           </a:p>
@@ -33969,7 +33311,7 @@
 </p:sld>
 </file>
 
-<file path=ppt/slides/slide18.xml><?xml version="1.0" encoding="utf-8"?>
+<file path=ppt/slides/slide17.xml><?xml version="1.0" encoding="utf-8"?>
 <p:sld xmlns:a="http://schemas.openxmlformats.org/drawingml/2006/main" xmlns:r="http://schemas.openxmlformats.org/officeDocument/2006/relationships" xmlns:p="http://schemas.openxmlformats.org/presentationml/2006/main" show="0">
   <p:cSld>
     <p:spTree>
@@ -34127,7 +33469,7 @@
             <a:fld id="{C058629E-FACD-49DF-B267-1FCF3764FFF9}" type="datetime1">
               <a:rPr lang="de-DE" smtClean="0"/>
               <a:pPr/>
-              <a:t>16.03.2021</a:t>
+              <a:t>29.03.2021</a:t>
             </a:fld>
             <a:endParaRPr lang="en-US" dirty="0"/>
           </a:p>
@@ -34174,7 +33516,7 @@
             <a:fld id="{2066355A-084C-D24E-9AD2-7E4FC41EA627}" type="slidenum">
               <a:rPr lang="en-US" smtClean="0"/>
               <a:pPr/>
-              <a:t>18</a:t>
+              <a:t>17</a:t>
             </a:fld>
             <a:endParaRPr lang="en-US" dirty="0"/>
           </a:p>
@@ -34784,7 +34126,7 @@
 </p:sld>
 </file>
 
-<file path=ppt/slides/slide19.xml><?xml version="1.0" encoding="utf-8"?>
+<file path=ppt/slides/slide18.xml><?xml version="1.0" encoding="utf-8"?>
 <p:sld xmlns:a="http://schemas.openxmlformats.org/drawingml/2006/main" xmlns:r="http://schemas.openxmlformats.org/officeDocument/2006/relationships" xmlns:p="http://schemas.openxmlformats.org/presentationml/2006/main" show="0">
   <p:cSld>
     <p:spTree>
@@ -34979,7 +34321,7 @@
             <a:fld id="{5B4F5383-CA52-4F6E-85CA-80EDFF909120}" type="datetime1">
               <a:rPr lang="de-DE" smtClean="0"/>
               <a:pPr/>
-              <a:t>16.03.2021</a:t>
+              <a:t>29.03.2021</a:t>
             </a:fld>
             <a:endParaRPr lang="en-US" dirty="0"/>
           </a:p>
@@ -35026,7 +34368,7 @@
             <a:fld id="{2066355A-084C-D24E-9AD2-7E4FC41EA627}" type="slidenum">
               <a:rPr lang="en-US" smtClean="0"/>
               <a:pPr/>
-              <a:t>19</a:t>
+              <a:t>18</a:t>
             </a:fld>
             <a:endParaRPr lang="en-US" dirty="0"/>
           </a:p>
@@ -36123,244 +35465,7 @@
 </p:sld>
 </file>
 
-<file path=ppt/slides/slide2.xml><?xml version="1.0" encoding="utf-8"?>
-<p:sld xmlns:a="http://schemas.openxmlformats.org/drawingml/2006/main" xmlns:r="http://schemas.openxmlformats.org/officeDocument/2006/relationships" xmlns:p="http://schemas.openxmlformats.org/presentationml/2006/main">
-  <p:cSld>
-    <p:spTree>
-      <p:nvGrpSpPr>
-        <p:cNvPr id="1" name=""/>
-        <p:cNvGrpSpPr/>
-        <p:nvPr/>
-      </p:nvGrpSpPr>
-      <p:grpSpPr>
-        <a:xfrm>
-          <a:off x="0" y="0"/>
-          <a:ext cx="0" cy="0"/>
-          <a:chOff x="0" y="0"/>
-          <a:chExt cx="0" cy="0"/>
-        </a:xfrm>
-      </p:grpSpPr>
-      <p:sp>
-        <p:nvSpPr>
-          <p:cNvPr id="2" name="Untertitel 1"/>
-          <p:cNvSpPr>
-            <a:spLocks noGrp="1"/>
-          </p:cNvSpPr>
-          <p:nvPr>
-            <p:ph type="subTitle" idx="1"/>
-          </p:nvPr>
-        </p:nvSpPr>
-        <p:spPr/>
-        <p:txBody>
-          <a:bodyPr/>
-          <a:lstStyle/>
-          <a:p>
-            <a:r>
-              <a:rPr lang="de-DE" dirty="0" err="1"/>
-              <a:t>microservice</a:t>
-            </a:r>
-            <a:r>
-              <a:rPr lang="de-DE" dirty="0"/>
-              <a:t> </a:t>
-            </a:r>
-            <a:r>
-              <a:rPr lang="de-DE" dirty="0" err="1"/>
-              <a:t>basics</a:t>
-            </a:r>
-            <a:endParaRPr lang="de-DE" dirty="0"/>
-          </a:p>
-        </p:txBody>
-      </p:sp>
-      <p:sp>
-        <p:nvSpPr>
-          <p:cNvPr id="3" name="Titel 2"/>
-          <p:cNvSpPr>
-            <a:spLocks noGrp="1"/>
-          </p:cNvSpPr>
-          <p:nvPr>
-            <p:ph type="title"/>
-          </p:nvPr>
-        </p:nvSpPr>
-        <p:spPr/>
-        <p:txBody>
-          <a:bodyPr/>
-          <a:lstStyle/>
-          <a:p>
-            <a:r>
-              <a:rPr lang="de-DE" dirty="0" err="1"/>
-              <a:t>QuickWin</a:t>
-            </a:r>
-            <a:r>
-              <a:rPr lang="de-DE" dirty="0"/>
-              <a:t>: </a:t>
-            </a:r>
-            <a:r>
-              <a:rPr lang="de-DE" dirty="0" err="1"/>
-              <a:t>Learn</a:t>
-            </a:r>
-            <a:r>
-              <a:rPr lang="de-DE" dirty="0"/>
-              <a:t> a </a:t>
-            </a:r>
-            <a:r>
-              <a:rPr lang="de-DE" dirty="0" err="1"/>
-              <a:t>little</a:t>
-            </a:r>
-            <a:r>
-              <a:rPr lang="de-DE" dirty="0"/>
-              <a:t> </a:t>
-            </a:r>
-            <a:r>
-              <a:rPr lang="de-DE" dirty="0" err="1"/>
-              <a:t>bit</a:t>
-            </a:r>
-            <a:r>
-              <a:rPr lang="de-DE" dirty="0"/>
-              <a:t> </a:t>
-            </a:r>
-            <a:r>
-              <a:rPr lang="de-DE" dirty="0" err="1"/>
-              <a:t>of</a:t>
-            </a:r>
-            <a:r>
-              <a:rPr lang="de-DE" dirty="0"/>
-              <a:t> GO</a:t>
-            </a:r>
-          </a:p>
-        </p:txBody>
-      </p:sp>
-      <p:sp>
-        <p:nvSpPr>
-          <p:cNvPr id="4" name="Textplatzhalter 3"/>
-          <p:cNvSpPr>
-            <a:spLocks noGrp="1"/>
-          </p:cNvSpPr>
-          <p:nvPr>
-            <p:ph type="body" sz="quarter" idx="10"/>
-          </p:nvPr>
-        </p:nvSpPr>
-        <p:spPr/>
-        <p:txBody>
-          <a:bodyPr/>
-          <a:lstStyle/>
-          <a:p>
-            <a:r>
-              <a:rPr lang="de-DE" dirty="0"/>
-              <a:t>Jochen Grün (ISO)</a:t>
-            </a:r>
-          </a:p>
-        </p:txBody>
-      </p:sp>
-      <p:sp>
-        <p:nvSpPr>
-          <p:cNvPr id="17" name="Datumsplatzhalter 16"/>
-          <p:cNvSpPr>
-            <a:spLocks noGrp="1"/>
-          </p:cNvSpPr>
-          <p:nvPr>
-            <p:ph type="dt" sz="half" idx="4294967295"/>
-          </p:nvPr>
-        </p:nvSpPr>
-        <p:spPr>
-          <a:xfrm>
-            <a:off x="527783" y="6890599"/>
-            <a:ext cx="1009042" cy="260350"/>
-          </a:xfrm>
-        </p:spPr>
-        <p:txBody>
-          <a:bodyPr/>
-          <a:lstStyle/>
-          <a:p>
-            <a:fld id="{F855CA7A-64CC-4CEA-BB65-02ED51AF645F}" type="datetime1">
-              <a:rPr lang="de-DE" smtClean="0"/>
-              <a:t>16.03.2021</a:t>
-            </a:fld>
-            <a:endParaRPr lang="de-DE" dirty="0"/>
-          </a:p>
-        </p:txBody>
-      </p:sp>
-      <p:sp>
-        <p:nvSpPr>
-          <p:cNvPr id="18" name="Fußzeilenplatzhalter 17"/>
-          <p:cNvSpPr>
-            <a:spLocks noGrp="1"/>
-          </p:cNvSpPr>
-          <p:nvPr>
-            <p:ph type="ftr" sz="quarter" idx="4294967295"/>
-          </p:nvPr>
-        </p:nvSpPr>
-        <p:spPr>
-          <a:xfrm>
-            <a:off x="1536819" y="6890596"/>
-            <a:ext cx="6671342" cy="260349"/>
-          </a:xfrm>
-        </p:spPr>
-        <p:txBody>
-          <a:bodyPr/>
-          <a:lstStyle/>
-          <a:p>
-            <a:r>
-              <a:rPr lang="de-DE" dirty="0"/>
-              <a:t>© MHP Management- und IT-Beratung GmbH</a:t>
-            </a:r>
-          </a:p>
-        </p:txBody>
-      </p:sp>
-      <p:sp>
-        <p:nvSpPr>
-          <p:cNvPr id="19" name="Foliennummernplatzhalter 18"/>
-          <p:cNvSpPr>
-            <a:spLocks noGrp="1"/>
-          </p:cNvSpPr>
-          <p:nvPr>
-            <p:ph type="sldNum" sz="quarter" idx="4294967295"/>
-          </p:nvPr>
-        </p:nvSpPr>
-        <p:spPr>
-          <a:xfrm>
-            <a:off x="11180740" y="6890595"/>
-            <a:ext cx="480321" cy="260349"/>
-          </a:xfrm>
-        </p:spPr>
-        <p:txBody>
-          <a:bodyPr/>
-          <a:lstStyle/>
-          <a:p>
-            <a:fld id="{2066355A-084C-D24E-9AD2-7E4FC41EA627}" type="slidenum">
-              <a:rPr lang="de-DE" smtClean="0"/>
-              <a:pPr/>
-              <a:t>2</a:t>
-            </a:fld>
-            <a:endParaRPr lang="de-DE" dirty="0"/>
-          </a:p>
-        </p:txBody>
-      </p:sp>
-    </p:spTree>
-    <p:extLst>
-      <p:ext uri="{BB962C8B-B14F-4D97-AF65-F5344CB8AC3E}">
-        <p14:creationId xmlns:p14="http://schemas.microsoft.com/office/powerpoint/2010/main" val="84961126"/>
-      </p:ext>
-    </p:extLst>
-  </p:cSld>
-  <p:clrMapOvr>
-    <a:masterClrMapping/>
-  </p:clrMapOvr>
-  <mc:AlternateContent xmlns:mc="http://schemas.openxmlformats.org/markup-compatibility/2006" xmlns:p14="http://schemas.microsoft.com/office/powerpoint/2010/main">
-    <mc:Choice Requires="p14">
-      <p:transition p14:dur="350">
-        <p:fade/>
-      </p:transition>
-    </mc:Choice>
-    <mc:Fallback xmlns="">
-      <p:transition xmlns:p14="http://schemas.microsoft.com/office/powerpoint/2010/main">
-        <p:fade/>
-      </p:transition>
-    </mc:Fallback>
-  </mc:AlternateContent>
-</p:sld>
-</file>
-
-<file path=ppt/slides/slide20.xml><?xml version="1.0" encoding="utf-8"?>
+<file path=ppt/slides/slide19.xml><?xml version="1.0" encoding="utf-8"?>
 <p:sld xmlns:a="http://schemas.openxmlformats.org/drawingml/2006/main" xmlns:r="http://schemas.openxmlformats.org/officeDocument/2006/relationships" xmlns:p="http://schemas.openxmlformats.org/presentationml/2006/main" show="0">
   <p:cSld>
     <p:spTree>
@@ -36510,7 +35615,7 @@
             <a:fld id="{3BB8C476-96A5-4CF8-8ABE-ACA7592E8F19}" type="datetime1">
               <a:rPr lang="de-DE" smtClean="0"/>
               <a:pPr/>
-              <a:t>16.03.2021</a:t>
+              <a:t>29.03.2021</a:t>
             </a:fld>
             <a:endParaRPr lang="en-US" dirty="0"/>
           </a:p>
@@ -36557,7 +35662,7 @@
             <a:fld id="{2066355A-084C-D24E-9AD2-7E4FC41EA627}" type="slidenum">
               <a:rPr lang="en-US" smtClean="0"/>
               <a:pPr/>
-              <a:t>20</a:t>
+              <a:t>19</a:t>
             </a:fld>
             <a:endParaRPr lang="en-US" dirty="0"/>
           </a:p>
@@ -37331,6 +36436,243 @@
 </p:sld>
 </file>
 
+<file path=ppt/slides/slide2.xml><?xml version="1.0" encoding="utf-8"?>
+<p:sld xmlns:a="http://schemas.openxmlformats.org/drawingml/2006/main" xmlns:r="http://schemas.openxmlformats.org/officeDocument/2006/relationships" xmlns:p="http://schemas.openxmlformats.org/presentationml/2006/main">
+  <p:cSld>
+    <p:spTree>
+      <p:nvGrpSpPr>
+        <p:cNvPr id="1" name=""/>
+        <p:cNvGrpSpPr/>
+        <p:nvPr/>
+      </p:nvGrpSpPr>
+      <p:grpSpPr>
+        <a:xfrm>
+          <a:off x="0" y="0"/>
+          <a:ext cx="0" cy="0"/>
+          <a:chOff x="0" y="0"/>
+          <a:chExt cx="0" cy="0"/>
+        </a:xfrm>
+      </p:grpSpPr>
+      <p:sp>
+        <p:nvSpPr>
+          <p:cNvPr id="2" name="Untertitel 1"/>
+          <p:cNvSpPr>
+            <a:spLocks noGrp="1"/>
+          </p:cNvSpPr>
+          <p:nvPr>
+            <p:ph type="subTitle" idx="1"/>
+          </p:nvPr>
+        </p:nvSpPr>
+        <p:spPr/>
+        <p:txBody>
+          <a:bodyPr/>
+          <a:lstStyle/>
+          <a:p>
+            <a:r>
+              <a:rPr lang="de-DE" dirty="0" err="1"/>
+              <a:t>microservice</a:t>
+            </a:r>
+            <a:r>
+              <a:rPr lang="de-DE" dirty="0"/>
+              <a:t> </a:t>
+            </a:r>
+            <a:r>
+              <a:rPr lang="de-DE" dirty="0" err="1"/>
+              <a:t>basics</a:t>
+            </a:r>
+            <a:endParaRPr lang="de-DE" dirty="0"/>
+          </a:p>
+        </p:txBody>
+      </p:sp>
+      <p:sp>
+        <p:nvSpPr>
+          <p:cNvPr id="3" name="Titel 2"/>
+          <p:cNvSpPr>
+            <a:spLocks noGrp="1"/>
+          </p:cNvSpPr>
+          <p:nvPr>
+            <p:ph type="title"/>
+          </p:nvPr>
+        </p:nvSpPr>
+        <p:spPr/>
+        <p:txBody>
+          <a:bodyPr/>
+          <a:lstStyle/>
+          <a:p>
+            <a:r>
+              <a:rPr lang="de-DE" dirty="0" err="1"/>
+              <a:t>QuickWin</a:t>
+            </a:r>
+            <a:r>
+              <a:rPr lang="de-DE" dirty="0"/>
+              <a:t>: </a:t>
+            </a:r>
+            <a:r>
+              <a:rPr lang="de-DE" dirty="0" err="1"/>
+              <a:t>Learn</a:t>
+            </a:r>
+            <a:r>
+              <a:rPr lang="de-DE" dirty="0"/>
+              <a:t> a </a:t>
+            </a:r>
+            <a:r>
+              <a:rPr lang="de-DE" dirty="0" err="1"/>
+              <a:t>little</a:t>
+            </a:r>
+            <a:r>
+              <a:rPr lang="de-DE" dirty="0"/>
+              <a:t> </a:t>
+            </a:r>
+            <a:r>
+              <a:rPr lang="de-DE" dirty="0" err="1"/>
+              <a:t>bit</a:t>
+            </a:r>
+            <a:r>
+              <a:rPr lang="de-DE" dirty="0"/>
+              <a:t> </a:t>
+            </a:r>
+            <a:r>
+              <a:rPr lang="de-DE" dirty="0" err="1"/>
+              <a:t>of</a:t>
+            </a:r>
+            <a:r>
+              <a:rPr lang="de-DE" dirty="0"/>
+              <a:t> GO</a:t>
+            </a:r>
+          </a:p>
+        </p:txBody>
+      </p:sp>
+      <p:sp>
+        <p:nvSpPr>
+          <p:cNvPr id="4" name="Textplatzhalter 3"/>
+          <p:cNvSpPr>
+            <a:spLocks noGrp="1"/>
+          </p:cNvSpPr>
+          <p:nvPr>
+            <p:ph type="body" sz="quarter" idx="10"/>
+          </p:nvPr>
+        </p:nvSpPr>
+        <p:spPr/>
+        <p:txBody>
+          <a:bodyPr/>
+          <a:lstStyle/>
+          <a:p>
+            <a:r>
+              <a:rPr lang="de-DE" dirty="0"/>
+              <a:t>Jochen Grün (ISO)</a:t>
+            </a:r>
+          </a:p>
+        </p:txBody>
+      </p:sp>
+      <p:sp>
+        <p:nvSpPr>
+          <p:cNvPr id="17" name="Datumsplatzhalter 16"/>
+          <p:cNvSpPr>
+            <a:spLocks noGrp="1"/>
+          </p:cNvSpPr>
+          <p:nvPr>
+            <p:ph type="dt" sz="half" idx="4294967295"/>
+          </p:nvPr>
+        </p:nvSpPr>
+        <p:spPr>
+          <a:xfrm>
+            <a:off x="527783" y="6890599"/>
+            <a:ext cx="1009042" cy="260350"/>
+          </a:xfrm>
+        </p:spPr>
+        <p:txBody>
+          <a:bodyPr/>
+          <a:lstStyle/>
+          <a:p>
+            <a:fld id="{F855CA7A-64CC-4CEA-BB65-02ED51AF645F}" type="datetime1">
+              <a:rPr lang="de-DE" smtClean="0"/>
+              <a:t>29.03.2021</a:t>
+            </a:fld>
+            <a:endParaRPr lang="de-DE" dirty="0"/>
+          </a:p>
+        </p:txBody>
+      </p:sp>
+      <p:sp>
+        <p:nvSpPr>
+          <p:cNvPr id="18" name="Fußzeilenplatzhalter 17"/>
+          <p:cNvSpPr>
+            <a:spLocks noGrp="1"/>
+          </p:cNvSpPr>
+          <p:nvPr>
+            <p:ph type="ftr" sz="quarter" idx="4294967295"/>
+          </p:nvPr>
+        </p:nvSpPr>
+        <p:spPr>
+          <a:xfrm>
+            <a:off x="1536819" y="6890596"/>
+            <a:ext cx="6671342" cy="260349"/>
+          </a:xfrm>
+        </p:spPr>
+        <p:txBody>
+          <a:bodyPr/>
+          <a:lstStyle/>
+          <a:p>
+            <a:r>
+              <a:rPr lang="de-DE" dirty="0"/>
+              <a:t>© MHP Management- und IT-Beratung GmbH</a:t>
+            </a:r>
+          </a:p>
+        </p:txBody>
+      </p:sp>
+      <p:sp>
+        <p:nvSpPr>
+          <p:cNvPr id="19" name="Foliennummernplatzhalter 18"/>
+          <p:cNvSpPr>
+            <a:spLocks noGrp="1"/>
+          </p:cNvSpPr>
+          <p:nvPr>
+            <p:ph type="sldNum" sz="quarter" idx="4294967295"/>
+          </p:nvPr>
+        </p:nvSpPr>
+        <p:spPr>
+          <a:xfrm>
+            <a:off x="11180740" y="6890595"/>
+            <a:ext cx="480321" cy="260349"/>
+          </a:xfrm>
+        </p:spPr>
+        <p:txBody>
+          <a:bodyPr/>
+          <a:lstStyle/>
+          <a:p>
+            <a:fld id="{2066355A-084C-D24E-9AD2-7E4FC41EA627}" type="slidenum">
+              <a:rPr lang="de-DE" smtClean="0"/>
+              <a:pPr/>
+              <a:t>2</a:t>
+            </a:fld>
+            <a:endParaRPr lang="de-DE" dirty="0"/>
+          </a:p>
+        </p:txBody>
+      </p:sp>
+    </p:spTree>
+    <p:extLst>
+      <p:ext uri="{BB962C8B-B14F-4D97-AF65-F5344CB8AC3E}">
+        <p14:creationId xmlns:p14="http://schemas.microsoft.com/office/powerpoint/2010/main" val="84961126"/>
+      </p:ext>
+    </p:extLst>
+  </p:cSld>
+  <p:clrMapOvr>
+    <a:masterClrMapping/>
+  </p:clrMapOvr>
+  <mc:AlternateContent xmlns:mc="http://schemas.openxmlformats.org/markup-compatibility/2006" xmlns:p14="http://schemas.microsoft.com/office/powerpoint/2010/main">
+    <mc:Choice Requires="p14">
+      <p:transition p14:dur="350">
+        <p:fade/>
+      </p:transition>
+    </mc:Choice>
+    <mc:Fallback xmlns="">
+      <p:transition xmlns:p14="http://schemas.microsoft.com/office/powerpoint/2010/main">
+        <p:fade/>
+      </p:transition>
+    </mc:Fallback>
+  </mc:AlternateContent>
+</p:sld>
+</file>
+
 <file path=ppt/slides/slide3.xml><?xml version="1.0" encoding="utf-8"?>
 <p:sld xmlns:a="http://schemas.openxmlformats.org/drawingml/2006/main" xmlns:r="http://schemas.openxmlformats.org/officeDocument/2006/relationships" xmlns:p="http://schemas.openxmlformats.org/presentationml/2006/main">
   <p:cSld>
@@ -37364,56 +36706,44 @@
           <a:lstStyle/>
           <a:p>
             <a:r>
+              <a:rPr lang="de-DE" dirty="0"/>
+              <a:t>Go </a:t>
+            </a:r>
+            <a:r>
               <a:rPr lang="de-DE" dirty="0" err="1"/>
-              <a:t>Microserv</a:t>
+              <a:t>introduced</a:t>
             </a:r>
             <a:endParaRPr lang="de-DE" dirty="0"/>
           </a:p>
           <a:p>
             <a:r>
               <a:rPr lang="de-DE" dirty="0"/>
-              <a:t>Inhalt</a:t>
-            </a:r>
+              <a:t>Microservice </a:t>
+            </a:r>
+            <a:r>
+              <a:rPr lang="de-DE" dirty="0" err="1"/>
+              <a:t>basics</a:t>
+            </a:r>
+            <a:endParaRPr lang="de-DE" dirty="0"/>
           </a:p>
           <a:p>
-            <a:pPr lvl="1"/>
-            <a:r>
-              <a:rPr lang="de-DE" dirty="0"/>
-              <a:t>Unterpunkt</a:t>
-            </a:r>
-          </a:p>
-          <a:p>
-            <a:pPr lvl="1"/>
-            <a:r>
-              <a:rPr lang="de-DE" dirty="0"/>
-              <a:t>Unterpunkt</a:t>
-            </a:r>
-          </a:p>
-          <a:p>
-            <a:r>
-              <a:rPr lang="de-DE" dirty="0"/>
-              <a:t>Inhalt</a:t>
-            </a:r>
-          </a:p>
-          <a:p>
-            <a:pPr lvl="1"/>
-            <a:r>
-              <a:rPr lang="de-DE" dirty="0"/>
-              <a:t>Unterpunkt</a:t>
-            </a:r>
-          </a:p>
-          <a:p>
-            <a:pPr lvl="1"/>
-            <a:r>
-              <a:rPr lang="de-DE" dirty="0"/>
-              <a:t>Unterpunkt</a:t>
-            </a:r>
-          </a:p>
-          <a:p>
-            <a:r>
-              <a:rPr lang="de-DE" dirty="0"/>
-              <a:t>Inhalt</a:t>
-            </a:r>
+            <a:r>
+              <a:rPr lang="de-DE" dirty="0"/>
+              <a:t>Implement a </a:t>
+            </a:r>
+            <a:r>
+              <a:rPr lang="de-DE" dirty="0" err="1"/>
+              <a:t>go</a:t>
+            </a:r>
+            <a:r>
+              <a:rPr lang="de-DE" dirty="0"/>
+              <a:t> </a:t>
+            </a:r>
+            <a:r>
+              <a:rPr lang="de-DE" dirty="0" err="1"/>
+              <a:t>service</a:t>
+            </a:r>
+            <a:endParaRPr lang="de-DE" dirty="0"/>
           </a:p>
         </p:txBody>
       </p:sp>
@@ -37456,7 +36786,7 @@
           <a:p>
             <a:fld id="{B0E726CA-4297-4D5D-BB64-B50431927A1B}" type="datetime1">
               <a:rPr lang="de-DE" smtClean="0"/>
-              <a:t>16.03.2021</a:t>
+              <a:t>29.03.2021</a:t>
             </a:fld>
             <a:endParaRPr lang="en-US" dirty="0"/>
           </a:p>
@@ -37553,203 +36883,6 @@
       </p:grpSpPr>
       <p:sp>
         <p:nvSpPr>
-          <p:cNvPr id="2" name="Textplatzhalter 1">
-            <a:extLst>
-              <a:ext uri="{FF2B5EF4-FFF2-40B4-BE49-F238E27FC236}">
-                <a16:creationId xmlns:a16="http://schemas.microsoft.com/office/drawing/2014/main" id="{ED18F5FB-DFAF-4392-8C4B-793940041213}"/>
-              </a:ext>
-            </a:extLst>
-          </p:cNvPr>
-          <p:cNvSpPr>
-            <a:spLocks noGrp="1"/>
-          </p:cNvSpPr>
-          <p:nvPr>
-            <p:ph type="body" sz="quarter" idx="10"/>
-          </p:nvPr>
-        </p:nvSpPr>
-        <p:spPr/>
-        <p:txBody>
-          <a:bodyPr/>
-          <a:lstStyle/>
-          <a:p>
-            <a:r>
-              <a:rPr lang="de-DE" dirty="0"/>
-              <a:t>Go </a:t>
-            </a:r>
-            <a:r>
-              <a:rPr lang="de-DE" dirty="0" err="1"/>
-              <a:t>Introduction</a:t>
-            </a:r>
-            <a:r>
-              <a:rPr lang="de-DE" dirty="0"/>
-              <a:t> (30m)</a:t>
-            </a:r>
-          </a:p>
-          <a:p>
-            <a:r>
-              <a:rPr lang="de-DE" dirty="0"/>
-              <a:t>Micro Service Coding (2h)</a:t>
-            </a:r>
-          </a:p>
-        </p:txBody>
-      </p:sp>
-      <p:sp>
-        <p:nvSpPr>
-          <p:cNvPr id="3" name="Titel 2">
-            <a:extLst>
-              <a:ext uri="{FF2B5EF4-FFF2-40B4-BE49-F238E27FC236}">
-                <a16:creationId xmlns:a16="http://schemas.microsoft.com/office/drawing/2014/main" id="{7E5B19B4-86B6-4F1B-A1E5-DF99F8325FA3}"/>
-              </a:ext>
-            </a:extLst>
-          </p:cNvPr>
-          <p:cNvSpPr>
-            <a:spLocks noGrp="1"/>
-          </p:cNvSpPr>
-          <p:nvPr>
-            <p:ph type="title"/>
-          </p:nvPr>
-        </p:nvSpPr>
-        <p:spPr/>
-        <p:txBody>
-          <a:bodyPr/>
-          <a:lstStyle/>
-          <a:p>
-            <a:endParaRPr lang="de-DE"/>
-          </a:p>
-        </p:txBody>
-      </p:sp>
-      <p:sp>
-        <p:nvSpPr>
-          <p:cNvPr id="4" name="Datumsplatzhalter 3">
-            <a:extLst>
-              <a:ext uri="{FF2B5EF4-FFF2-40B4-BE49-F238E27FC236}">
-                <a16:creationId xmlns:a16="http://schemas.microsoft.com/office/drawing/2014/main" id="{722AA706-CA9A-4702-925C-D8C2E32F21E3}"/>
-              </a:ext>
-            </a:extLst>
-          </p:cNvPr>
-          <p:cNvSpPr>
-            <a:spLocks noGrp="1"/>
-          </p:cNvSpPr>
-          <p:nvPr>
-            <p:ph type="dt" sz="half" idx="11"/>
-          </p:nvPr>
-        </p:nvSpPr>
-        <p:spPr/>
-        <p:txBody>
-          <a:bodyPr/>
-          <a:lstStyle/>
-          <a:p>
-            <a:fld id="{0A53F34A-1776-4CF9-A7B7-801786891889}" type="datetime1">
-              <a:rPr lang="de-DE" smtClean="0"/>
-              <a:t>16.03.2021</a:t>
-            </a:fld>
-            <a:endParaRPr lang="en-US" dirty="0"/>
-          </a:p>
-        </p:txBody>
-      </p:sp>
-      <p:sp>
-        <p:nvSpPr>
-          <p:cNvPr id="5" name="Fußzeilenplatzhalter 4">
-            <a:extLst>
-              <a:ext uri="{FF2B5EF4-FFF2-40B4-BE49-F238E27FC236}">
-                <a16:creationId xmlns:a16="http://schemas.microsoft.com/office/drawing/2014/main" id="{A2136A7C-B98D-47DF-B8AB-77B60EA4AD6B}"/>
-              </a:ext>
-            </a:extLst>
-          </p:cNvPr>
-          <p:cNvSpPr>
-            <a:spLocks noGrp="1"/>
-          </p:cNvSpPr>
-          <p:nvPr>
-            <p:ph type="ftr" sz="quarter" idx="12"/>
-          </p:nvPr>
-        </p:nvSpPr>
-        <p:spPr/>
-        <p:txBody>
-          <a:bodyPr/>
-          <a:lstStyle/>
-          <a:p>
-            <a:r>
-              <a:rPr lang="de-DE"/>
-              <a:t>© MHP Management- und IT-Beratung GmbH</a:t>
-            </a:r>
-            <a:endParaRPr lang="en-US" dirty="0"/>
-          </a:p>
-        </p:txBody>
-      </p:sp>
-      <p:sp>
-        <p:nvSpPr>
-          <p:cNvPr id="6" name="Foliennummernplatzhalter 5">
-            <a:extLst>
-              <a:ext uri="{FF2B5EF4-FFF2-40B4-BE49-F238E27FC236}">
-                <a16:creationId xmlns:a16="http://schemas.microsoft.com/office/drawing/2014/main" id="{DF1E7FE0-D806-4966-8C76-7DAFBA21F886}"/>
-              </a:ext>
-            </a:extLst>
-          </p:cNvPr>
-          <p:cNvSpPr>
-            <a:spLocks noGrp="1"/>
-          </p:cNvSpPr>
-          <p:nvPr>
-            <p:ph type="sldNum" sz="quarter" idx="13"/>
-          </p:nvPr>
-        </p:nvSpPr>
-        <p:spPr/>
-        <p:txBody>
-          <a:bodyPr/>
-          <a:lstStyle/>
-          <a:p>
-            <a:fld id="{2066355A-084C-D24E-9AD2-7E4FC41EA627}" type="slidenum">
-              <a:rPr lang="en-US" smtClean="0"/>
-              <a:pPr/>
-              <a:t>4</a:t>
-            </a:fld>
-            <a:endParaRPr lang="en-US" dirty="0"/>
-          </a:p>
-        </p:txBody>
-      </p:sp>
-    </p:spTree>
-    <p:extLst>
-      <p:ext uri="{BB962C8B-B14F-4D97-AF65-F5344CB8AC3E}">
-        <p14:creationId xmlns:p14="http://schemas.microsoft.com/office/powerpoint/2010/main" val="3037371977"/>
-      </p:ext>
-    </p:extLst>
-  </p:cSld>
-  <p:clrMapOvr>
-    <a:masterClrMapping/>
-  </p:clrMapOvr>
-  <mc:AlternateContent xmlns:mc="http://schemas.openxmlformats.org/markup-compatibility/2006" xmlns:p14="http://schemas.microsoft.com/office/powerpoint/2010/main">
-    <mc:Choice Requires="p14">
-      <p:transition p14:dur="350">
-        <p:fade/>
-      </p:transition>
-    </mc:Choice>
-    <mc:Fallback xmlns="">
-      <p:transition xmlns:p14="http://schemas.microsoft.com/office/powerpoint/2010/main">
-        <p:fade/>
-      </p:transition>
-    </mc:Fallback>
-  </mc:AlternateContent>
-</p:sld>
-</file>
-
-<file path=ppt/slides/slide5.xml><?xml version="1.0" encoding="utf-8"?>
-<p:sld xmlns:a="http://schemas.openxmlformats.org/drawingml/2006/main" xmlns:r="http://schemas.openxmlformats.org/officeDocument/2006/relationships" xmlns:p="http://schemas.openxmlformats.org/presentationml/2006/main">
-  <p:cSld>
-    <p:spTree>
-      <p:nvGrpSpPr>
-        <p:cNvPr id="1" name=""/>
-        <p:cNvGrpSpPr/>
-        <p:nvPr/>
-      </p:nvGrpSpPr>
-      <p:grpSpPr>
-        <a:xfrm>
-          <a:off x="0" y="0"/>
-          <a:ext cx="0" cy="0"/>
-          <a:chOff x="0" y="0"/>
-          <a:chExt cx="0" cy="0"/>
-        </a:xfrm>
-      </p:grpSpPr>
-      <p:sp>
-        <p:nvSpPr>
           <p:cNvPr id="12" name="Textplatzhalter 11"/>
           <p:cNvSpPr>
             <a:spLocks noGrp="1"/>
@@ -38173,7 +37306,7 @@
             <a:fld id="{70E9AACE-BDBD-415B-8195-34948F18EBB2}" type="datetime1">
               <a:rPr lang="de-DE" smtClean="0"/>
               <a:pPr/>
-              <a:t>16.03.2021</a:t>
+              <a:t>29.03.2021</a:t>
             </a:fld>
             <a:endParaRPr lang="en-US" dirty="0"/>
           </a:p>
@@ -38220,7 +37353,7 @@
             <a:fld id="{2066355A-084C-D24E-9AD2-7E4FC41EA627}" type="slidenum">
               <a:rPr lang="en-US" smtClean="0"/>
               <a:pPr/>
-              <a:t>5</a:t>
+              <a:t>4</a:t>
             </a:fld>
             <a:endParaRPr lang="en-US" dirty="0"/>
           </a:p>
@@ -38270,7 +37403,7 @@
 </p:sld>
 </file>
 
-<file path=ppt/slides/slide6.xml><?xml version="1.0" encoding="utf-8"?>
+<file path=ppt/slides/slide5.xml><?xml version="1.0" encoding="utf-8"?>
 <p:sld xmlns:a="http://schemas.openxmlformats.org/drawingml/2006/main" xmlns:r="http://schemas.openxmlformats.org/officeDocument/2006/relationships" xmlns:p="http://schemas.openxmlformats.org/presentationml/2006/main">
   <p:cSld>
     <p:spTree>
@@ -38340,7 +37473,7 @@
           <a:p>
             <a:fld id="{43CE7C91-877C-44D6-9892-950E5E0626D1}" type="datetime1">
               <a:rPr lang="de-DE" smtClean="0"/>
-              <a:t>16.03.2021</a:t>
+              <a:t>29.03.2021</a:t>
             </a:fld>
             <a:endParaRPr lang="en-US" dirty="0"/>
           </a:p>
@@ -38399,7 +37532,7 @@
             <a:fld id="{2066355A-084C-D24E-9AD2-7E4FC41EA627}" type="slidenum">
               <a:rPr lang="en-US" smtClean="0"/>
               <a:pPr/>
-              <a:t>6</a:t>
+              <a:t>5</a:t>
             </a:fld>
             <a:endParaRPr lang="en-US" dirty="0"/>
           </a:p>
@@ -38521,7 +37654,7 @@
 </p:sld>
 </file>
 
-<file path=ppt/slides/slide7.xml><?xml version="1.0" encoding="utf-8"?>
+<file path=ppt/slides/slide6.xml><?xml version="1.0" encoding="utf-8"?>
 <p:sld xmlns:a="http://schemas.openxmlformats.org/drawingml/2006/main" xmlns:r="http://schemas.openxmlformats.org/officeDocument/2006/relationships" xmlns:p="http://schemas.openxmlformats.org/presentationml/2006/main">
   <p:cSld>
     <p:spTree>
@@ -38652,12 +37785,20 @@
               <a:t>: </a:t>
             </a:r>
             <a:r>
-              <a:rPr lang="de-DE" err="1"/>
+              <a:rPr lang="de-DE" dirty="0" err="1"/>
               <a:t>define</a:t>
             </a:r>
             <a:r>
-              <a:rPr lang="de-DE"/>
-              <a:t> package in a </a:t>
+              <a:rPr lang="de-DE" dirty="0"/>
+              <a:t> </a:t>
+            </a:r>
+            <a:r>
+              <a:rPr lang="de-DE" dirty="0" err="1"/>
+              <a:t>package</a:t>
+            </a:r>
+            <a:r>
+              <a:rPr lang="de-DE" dirty="0"/>
+              <a:t> in a </a:t>
             </a:r>
             <a:r>
               <a:rPr lang="de-DE" dirty="0" err="1"/>
@@ -39018,7 +38159,7 @@
           <a:p>
             <a:fld id="{43CE7C91-877C-44D6-9892-950E5E0626D1}" type="datetime1">
               <a:rPr lang="de-DE" smtClean="0"/>
-              <a:t>16.03.2021</a:t>
+              <a:t>29.03.2021</a:t>
             </a:fld>
             <a:endParaRPr lang="en-US" dirty="0"/>
           </a:p>
@@ -39077,7 +38218,7 @@
             <a:fld id="{2066355A-084C-D24E-9AD2-7E4FC41EA627}" type="slidenum">
               <a:rPr lang="en-US" smtClean="0"/>
               <a:pPr/>
-              <a:t>7</a:t>
+              <a:t>6</a:t>
             </a:fld>
             <a:endParaRPr lang="en-US" dirty="0"/>
           </a:p>
@@ -39166,7 +38307,7 @@
 </p:sld>
 </file>
 
-<file path=ppt/slides/slide8.xml><?xml version="1.0" encoding="utf-8"?>
+<file path=ppt/slides/slide7.xml><?xml version="1.0" encoding="utf-8"?>
 <p:sld xmlns:a="http://schemas.openxmlformats.org/drawingml/2006/main" xmlns:r="http://schemas.openxmlformats.org/officeDocument/2006/relationships" xmlns:p="http://schemas.openxmlformats.org/presentationml/2006/main">
   <p:cSld>
     <p:spTree>
@@ -39510,7 +38651,7 @@
           <a:p>
             <a:fld id="{43CE7C91-877C-44D6-9892-950E5E0626D1}" type="datetime1">
               <a:rPr lang="de-DE" smtClean="0"/>
-              <a:t>16.03.2021</a:t>
+              <a:t>29.03.2021</a:t>
             </a:fld>
             <a:endParaRPr lang="en-US" dirty="0"/>
           </a:p>
@@ -39569,7 +38710,7 @@
             <a:fld id="{2066355A-084C-D24E-9AD2-7E4FC41EA627}" type="slidenum">
               <a:rPr lang="en-US" smtClean="0"/>
               <a:pPr/>
-              <a:t>8</a:t>
+              <a:t>7</a:t>
             </a:fld>
             <a:endParaRPr lang="en-US" dirty="0"/>
           </a:p>
@@ -39632,6 +38773,533 @@
     <p:extLst>
       <p:ext uri="{BB962C8B-B14F-4D97-AF65-F5344CB8AC3E}">
         <p14:creationId xmlns:p14="http://schemas.microsoft.com/office/powerpoint/2010/main" val="938989098"/>
+      </p:ext>
+    </p:extLst>
+  </p:cSld>
+  <p:clrMapOvr>
+    <a:masterClrMapping/>
+  </p:clrMapOvr>
+  <mc:AlternateContent xmlns:mc="http://schemas.openxmlformats.org/markup-compatibility/2006" xmlns:p14="http://schemas.microsoft.com/office/powerpoint/2010/main">
+    <mc:Choice Requires="p14">
+      <p:transition p14:dur="350">
+        <p:fade/>
+      </p:transition>
+    </mc:Choice>
+    <mc:Fallback xmlns="">
+      <p:transition xmlns:p14="http://schemas.microsoft.com/office/powerpoint/2010/main">
+        <p:fade/>
+      </p:transition>
+    </mc:Fallback>
+  </mc:AlternateContent>
+</p:sld>
+</file>
+
+<file path=ppt/slides/slide8.xml><?xml version="1.0" encoding="utf-8"?>
+<p:sld xmlns:a="http://schemas.openxmlformats.org/drawingml/2006/main" xmlns:r="http://schemas.openxmlformats.org/officeDocument/2006/relationships" xmlns:p="http://schemas.openxmlformats.org/presentationml/2006/main">
+  <p:cSld>
+    <p:spTree>
+      <p:nvGrpSpPr>
+        <p:cNvPr id="1" name=""/>
+        <p:cNvGrpSpPr/>
+        <p:nvPr/>
+      </p:nvGrpSpPr>
+      <p:grpSpPr>
+        <a:xfrm>
+          <a:off x="0" y="0"/>
+          <a:ext cx="0" cy="0"/>
+          <a:chOff x="0" y="0"/>
+          <a:chExt cx="0" cy="0"/>
+        </a:xfrm>
+      </p:grpSpPr>
+      <p:sp>
+        <p:nvSpPr>
+          <p:cNvPr id="2" name="Textplatzhalter 1">
+            <a:extLst>
+              <a:ext uri="{FF2B5EF4-FFF2-40B4-BE49-F238E27FC236}">
+                <a16:creationId xmlns:a16="http://schemas.microsoft.com/office/drawing/2014/main" id="{83208DC2-F530-4691-9476-F2E42EA0176A}"/>
+              </a:ext>
+            </a:extLst>
+          </p:cNvPr>
+          <p:cNvSpPr>
+            <a:spLocks noGrp="1"/>
+          </p:cNvSpPr>
+          <p:nvPr>
+            <p:ph type="body" sz="quarter" idx="22"/>
+          </p:nvPr>
+        </p:nvSpPr>
+        <p:spPr/>
+        <p:txBody>
+          <a:bodyPr/>
+          <a:lstStyle/>
+          <a:p>
+            <a:pPr lvl="1"/>
+            <a:r>
+              <a:rPr lang="de-DE" dirty="0"/>
+              <a:t>a </a:t>
+            </a:r>
+            <a:r>
+              <a:rPr lang="de-DE" dirty="0" err="1"/>
+              <a:t>struct</a:t>
+            </a:r>
+            <a:r>
+              <a:rPr lang="de-DE" dirty="0"/>
+              <a:t> </a:t>
+            </a:r>
+            <a:r>
+              <a:rPr lang="de-DE" dirty="0" err="1"/>
+              <a:t>is</a:t>
+            </a:r>
+            <a:r>
+              <a:rPr lang="de-DE" dirty="0"/>
+              <a:t> </a:t>
+            </a:r>
+            <a:r>
+              <a:rPr lang="de-DE" dirty="0" err="1"/>
+              <a:t>very</a:t>
+            </a:r>
+            <a:r>
+              <a:rPr lang="de-DE" dirty="0"/>
+              <a:t> </a:t>
+            </a:r>
+            <a:r>
+              <a:rPr lang="de-DE" dirty="0" err="1"/>
+              <a:t>similar</a:t>
+            </a:r>
+            <a:r>
+              <a:rPr lang="de-DE" dirty="0"/>
+              <a:t> </a:t>
+            </a:r>
+            <a:r>
+              <a:rPr lang="de-DE" dirty="0" err="1"/>
+              <a:t>to</a:t>
+            </a:r>
+            <a:r>
+              <a:rPr lang="de-DE" dirty="0"/>
+              <a:t> a C </a:t>
+            </a:r>
+            <a:r>
+              <a:rPr lang="de-DE" dirty="0" err="1"/>
+              <a:t>struct</a:t>
+            </a:r>
+            <a:r>
+              <a:rPr lang="de-DE" dirty="0"/>
+              <a:t>: </a:t>
+            </a:r>
+            <a:r>
+              <a:rPr lang="de-DE" dirty="0" err="1"/>
+              <a:t>memory</a:t>
+            </a:r>
+            <a:r>
+              <a:rPr lang="de-DE" dirty="0"/>
+              <a:t> block </a:t>
+            </a:r>
+            <a:r>
+              <a:rPr lang="de-DE" dirty="0" err="1"/>
+              <a:t>of</a:t>
+            </a:r>
+            <a:r>
+              <a:rPr lang="de-DE" dirty="0"/>
+              <a:t> </a:t>
+            </a:r>
+            <a:r>
+              <a:rPr lang="de-DE" dirty="0" err="1"/>
+              <a:t>fixed</a:t>
+            </a:r>
+            <a:r>
+              <a:rPr lang="de-DE" dirty="0"/>
+              <a:t> </a:t>
+            </a:r>
+            <a:r>
+              <a:rPr lang="de-DE" dirty="0" err="1"/>
+              <a:t>size</a:t>
+            </a:r>
+            <a:r>
+              <a:rPr lang="de-DE" dirty="0"/>
+              <a:t> </a:t>
+            </a:r>
+            <a:r>
+              <a:rPr lang="de-DE" dirty="0" err="1"/>
+              <a:t>with</a:t>
+            </a:r>
+            <a:r>
+              <a:rPr lang="de-DE" dirty="0"/>
+              <a:t> </a:t>
+            </a:r>
+            <a:r>
+              <a:rPr lang="de-DE" dirty="0" err="1"/>
+              <a:t>named</a:t>
+            </a:r>
+            <a:r>
+              <a:rPr lang="de-DE" dirty="0"/>
+              <a:t> </a:t>
+            </a:r>
+            <a:r>
+              <a:rPr lang="de-DE" dirty="0" err="1"/>
+              <a:t>fields</a:t>
+            </a:r>
+            <a:endParaRPr lang="de-DE" dirty="0"/>
+          </a:p>
+          <a:p>
+            <a:pPr lvl="1"/>
+            <a:r>
+              <a:rPr lang="de-DE" dirty="0" err="1"/>
+              <a:t>you</a:t>
+            </a:r>
+            <a:r>
+              <a:rPr lang="de-DE" dirty="0"/>
+              <a:t> </a:t>
+            </a:r>
+            <a:r>
+              <a:rPr lang="de-DE" dirty="0" err="1"/>
+              <a:t>can</a:t>
+            </a:r>
+            <a:r>
+              <a:rPr lang="de-DE" dirty="0"/>
+              <a:t> </a:t>
+            </a:r>
+            <a:r>
+              <a:rPr lang="de-DE" dirty="0" err="1"/>
+              <a:t>attach</a:t>
+            </a:r>
+            <a:r>
+              <a:rPr lang="de-DE" dirty="0"/>
+              <a:t> </a:t>
+            </a:r>
+            <a:r>
+              <a:rPr lang="de-DE" dirty="0" err="1"/>
+              <a:t>functions</a:t>
+            </a:r>
+            <a:r>
+              <a:rPr lang="de-DE" dirty="0"/>
+              <a:t> </a:t>
+            </a:r>
+            <a:r>
+              <a:rPr lang="de-DE" dirty="0" err="1"/>
+              <a:t>to</a:t>
+            </a:r>
+            <a:r>
+              <a:rPr lang="de-DE" dirty="0"/>
+              <a:t> </a:t>
+            </a:r>
+            <a:r>
+              <a:rPr lang="de-DE" dirty="0" err="1"/>
+              <a:t>structs</a:t>
+            </a:r>
+            <a:r>
+              <a:rPr lang="de-DE" dirty="0"/>
+              <a:t> via </a:t>
+            </a:r>
+            <a:r>
+              <a:rPr lang="de-DE" dirty="0" err="1"/>
+              <a:t>receivers</a:t>
+            </a:r>
+            <a:r>
+              <a:rPr lang="de-DE" dirty="0"/>
+              <a:t> (</a:t>
+            </a:r>
+            <a:r>
+              <a:rPr lang="de-DE" dirty="0" err="1"/>
+              <a:t>which</a:t>
+            </a:r>
+            <a:r>
+              <a:rPr lang="de-DE" dirty="0"/>
+              <a:t> </a:t>
+            </a:r>
+            <a:r>
+              <a:rPr lang="de-DE" dirty="0" err="1"/>
+              <a:t>makes</a:t>
+            </a:r>
+            <a:r>
+              <a:rPr lang="de-DE" dirty="0"/>
+              <a:t> </a:t>
+            </a:r>
+            <a:r>
+              <a:rPr lang="de-DE" dirty="0" err="1"/>
+              <a:t>them</a:t>
+            </a:r>
+            <a:r>
+              <a:rPr lang="de-DE" dirty="0"/>
+              <a:t> </a:t>
+            </a:r>
+            <a:r>
+              <a:rPr lang="de-DE" dirty="0" err="1"/>
+              <a:t>class</a:t>
+            </a:r>
+            <a:r>
+              <a:rPr lang="de-DE" dirty="0"/>
+              <a:t> like)</a:t>
+            </a:r>
+          </a:p>
+          <a:p>
+            <a:pPr lvl="1"/>
+            <a:r>
+              <a:rPr lang="de-DE" dirty="0" err="1"/>
+              <a:t>lowercase</a:t>
+            </a:r>
+            <a:r>
+              <a:rPr lang="de-DE" dirty="0"/>
+              <a:t> </a:t>
+            </a:r>
+            <a:r>
+              <a:rPr lang="de-DE" dirty="0" err="1"/>
+              <a:t>starting</a:t>
+            </a:r>
+            <a:r>
+              <a:rPr lang="de-DE" dirty="0"/>
+              <a:t> </a:t>
+            </a:r>
+            <a:r>
+              <a:rPr lang="de-DE" dirty="0" err="1"/>
+              <a:t>letter</a:t>
+            </a:r>
+            <a:r>
+              <a:rPr lang="de-DE" dirty="0"/>
+              <a:t> </a:t>
+            </a:r>
+            <a:r>
+              <a:rPr lang="de-DE" dirty="0" err="1"/>
+              <a:t>makes</a:t>
+            </a:r>
+            <a:r>
+              <a:rPr lang="de-DE" dirty="0"/>
+              <a:t> a </a:t>
+            </a:r>
+            <a:r>
+              <a:rPr lang="de-DE" dirty="0" err="1"/>
+              <a:t>property</a:t>
+            </a:r>
+            <a:r>
+              <a:rPr lang="de-DE" dirty="0"/>
+              <a:t> </a:t>
+            </a:r>
+            <a:r>
+              <a:rPr lang="de-DE" dirty="0" err="1"/>
+              <a:t>package</a:t>
+            </a:r>
+            <a:r>
+              <a:rPr lang="de-DE" dirty="0"/>
+              <a:t> internal (</a:t>
+            </a:r>
+            <a:r>
+              <a:rPr lang="de-DE" dirty="0" err="1"/>
+              <a:t>reflection</a:t>
+            </a:r>
+            <a:r>
+              <a:rPr lang="de-DE" dirty="0"/>
+              <a:t> will not </a:t>
+            </a:r>
+            <a:r>
+              <a:rPr lang="de-DE" dirty="0" err="1"/>
+              <a:t>work</a:t>
+            </a:r>
+            <a:r>
+              <a:rPr lang="de-DE" dirty="0"/>
+              <a:t>, e.g. on tags)</a:t>
+            </a:r>
+          </a:p>
+          <a:p>
+            <a:pPr lvl="1"/>
+            <a:r>
+              <a:rPr lang="de-DE" dirty="0" err="1"/>
+              <a:t>uppercase</a:t>
+            </a:r>
+            <a:r>
+              <a:rPr lang="de-DE" dirty="0"/>
+              <a:t> </a:t>
+            </a:r>
+            <a:r>
+              <a:rPr lang="de-DE" dirty="0" err="1"/>
+              <a:t>starting</a:t>
+            </a:r>
+            <a:r>
+              <a:rPr lang="de-DE" dirty="0"/>
+              <a:t> </a:t>
+            </a:r>
+            <a:r>
+              <a:rPr lang="de-DE" dirty="0" err="1"/>
+              <a:t>letter</a:t>
+            </a:r>
+            <a:r>
+              <a:rPr lang="de-DE" dirty="0"/>
+              <a:t> </a:t>
+            </a:r>
+            <a:r>
+              <a:rPr lang="de-DE" dirty="0" err="1"/>
+              <a:t>makes</a:t>
+            </a:r>
+            <a:r>
+              <a:rPr lang="de-DE" dirty="0"/>
+              <a:t> </a:t>
+            </a:r>
+            <a:r>
+              <a:rPr lang="de-DE" dirty="0" err="1"/>
+              <a:t>property</a:t>
+            </a:r>
+            <a:r>
+              <a:rPr lang="de-DE" dirty="0"/>
+              <a:t> visible outside </a:t>
+            </a:r>
+            <a:r>
+              <a:rPr lang="de-DE" dirty="0" err="1"/>
+              <a:t>package</a:t>
+            </a:r>
+            <a:r>
+              <a:rPr lang="de-DE" dirty="0"/>
+              <a:t> </a:t>
+            </a:r>
+          </a:p>
+        </p:txBody>
+      </p:sp>
+      <p:sp>
+        <p:nvSpPr>
+          <p:cNvPr id="3" name="Datumsplatzhalter 2">
+            <a:extLst>
+              <a:ext uri="{FF2B5EF4-FFF2-40B4-BE49-F238E27FC236}">
+                <a16:creationId xmlns:a16="http://schemas.microsoft.com/office/drawing/2014/main" id="{32EBC5BF-671D-4EA8-8245-A3308A329928}"/>
+              </a:ext>
+            </a:extLst>
+          </p:cNvPr>
+          <p:cNvSpPr>
+            <a:spLocks noGrp="1"/>
+          </p:cNvSpPr>
+          <p:nvPr>
+            <p:ph type="dt" sz="half" idx="23"/>
+          </p:nvPr>
+        </p:nvSpPr>
+        <p:spPr/>
+        <p:txBody>
+          <a:bodyPr/>
+          <a:lstStyle/>
+          <a:p>
+            <a:fld id="{43CE7C91-877C-44D6-9892-950E5E0626D1}" type="datetime1">
+              <a:rPr lang="de-DE" smtClean="0"/>
+              <a:t>29.03.2021</a:t>
+            </a:fld>
+            <a:endParaRPr lang="en-US" dirty="0"/>
+          </a:p>
+        </p:txBody>
+      </p:sp>
+      <p:sp>
+        <p:nvSpPr>
+          <p:cNvPr id="4" name="Fußzeilenplatzhalter 3">
+            <a:extLst>
+              <a:ext uri="{FF2B5EF4-FFF2-40B4-BE49-F238E27FC236}">
+                <a16:creationId xmlns:a16="http://schemas.microsoft.com/office/drawing/2014/main" id="{757DFC5B-DF21-4855-94BC-4CACAE702E1E}"/>
+              </a:ext>
+            </a:extLst>
+          </p:cNvPr>
+          <p:cNvSpPr>
+            <a:spLocks noGrp="1"/>
+          </p:cNvSpPr>
+          <p:nvPr>
+            <p:ph type="ftr" sz="quarter" idx="24"/>
+          </p:nvPr>
+        </p:nvSpPr>
+        <p:spPr/>
+        <p:txBody>
+          <a:bodyPr/>
+          <a:lstStyle/>
+          <a:p>
+            <a:r>
+              <a:rPr lang="de-DE"/>
+              <a:t>© MHP Management- und IT-Beratung GmbH</a:t>
+            </a:r>
+            <a:endParaRPr lang="en-US" dirty="0"/>
+          </a:p>
+        </p:txBody>
+      </p:sp>
+      <p:sp>
+        <p:nvSpPr>
+          <p:cNvPr id="5" name="Foliennummernplatzhalter 4">
+            <a:extLst>
+              <a:ext uri="{FF2B5EF4-FFF2-40B4-BE49-F238E27FC236}">
+                <a16:creationId xmlns:a16="http://schemas.microsoft.com/office/drawing/2014/main" id="{C31ABE4D-78C9-4DE3-BB99-689A809DAA6C}"/>
+              </a:ext>
+            </a:extLst>
+          </p:cNvPr>
+          <p:cNvSpPr>
+            <a:spLocks noGrp="1"/>
+          </p:cNvSpPr>
+          <p:nvPr>
+            <p:ph type="sldNum" sz="quarter" idx="25"/>
+          </p:nvPr>
+        </p:nvSpPr>
+        <p:spPr/>
+        <p:txBody>
+          <a:bodyPr/>
+          <a:lstStyle/>
+          <a:p>
+            <a:fld id="{2066355A-084C-D24E-9AD2-7E4FC41EA627}" type="slidenum">
+              <a:rPr lang="en-US" smtClean="0"/>
+              <a:pPr/>
+              <a:t>8</a:t>
+            </a:fld>
+            <a:endParaRPr lang="en-US" dirty="0"/>
+          </a:p>
+        </p:txBody>
+      </p:sp>
+      <p:sp>
+        <p:nvSpPr>
+          <p:cNvPr id="6" name="Textplatzhalter 5">
+            <a:extLst>
+              <a:ext uri="{FF2B5EF4-FFF2-40B4-BE49-F238E27FC236}">
+                <a16:creationId xmlns:a16="http://schemas.microsoft.com/office/drawing/2014/main" id="{78B71ED7-D7C6-4561-BE05-565FF9BF8C18}"/>
+              </a:ext>
+            </a:extLst>
+          </p:cNvPr>
+          <p:cNvSpPr>
+            <a:spLocks noGrp="1"/>
+          </p:cNvSpPr>
+          <p:nvPr>
+            <p:ph type="body" sz="quarter" idx="27"/>
+          </p:nvPr>
+        </p:nvSpPr>
+        <p:spPr/>
+        <p:txBody>
+          <a:bodyPr/>
+          <a:lstStyle/>
+          <a:p>
+            <a:endParaRPr lang="de-DE"/>
+          </a:p>
+        </p:txBody>
+      </p:sp>
+      <p:sp>
+        <p:nvSpPr>
+          <p:cNvPr id="7" name="Titel 6">
+            <a:extLst>
+              <a:ext uri="{FF2B5EF4-FFF2-40B4-BE49-F238E27FC236}">
+                <a16:creationId xmlns:a16="http://schemas.microsoft.com/office/drawing/2014/main" id="{45C35AED-8839-4A0E-A8C2-BF8A4BC9BD39}"/>
+              </a:ext>
+            </a:extLst>
+          </p:cNvPr>
+          <p:cNvSpPr>
+            <a:spLocks noGrp="1"/>
+          </p:cNvSpPr>
+          <p:nvPr>
+            <p:ph type="title"/>
+          </p:nvPr>
+        </p:nvSpPr>
+        <p:spPr/>
+        <p:txBody>
+          <a:bodyPr/>
+          <a:lstStyle/>
+          <a:p>
+            <a:r>
+              <a:rPr lang="de-DE" dirty="0"/>
+              <a:t>Go </a:t>
+            </a:r>
+            <a:r>
+              <a:rPr lang="de-DE" dirty="0" err="1"/>
+              <a:t>Structs</a:t>
+            </a:r>
+            <a:endParaRPr lang="de-DE" dirty="0"/>
+          </a:p>
+        </p:txBody>
+      </p:sp>
+    </p:spTree>
+    <p:extLst>
+      <p:ext uri="{BB962C8B-B14F-4D97-AF65-F5344CB8AC3E}">
+        <p14:creationId xmlns:p14="http://schemas.microsoft.com/office/powerpoint/2010/main" val="2700646792"/>
       </p:ext>
     </p:extLst>
   </p:cSld>
@@ -39694,7 +39362,7 @@
             <a:pPr lvl="1"/>
             <a:r>
               <a:rPr lang="de-DE" dirty="0" err="1"/>
-              <a:t>lowercase</a:t>
+              <a:t>test</a:t>
             </a:r>
             <a:r>
               <a:rPr lang="de-DE" dirty="0"/>
@@ -39702,7 +39370,7 @@
             </a:r>
             <a:r>
               <a:rPr lang="de-DE" dirty="0" err="1"/>
-              <a:t>starting</a:t>
+              <a:t>files</a:t>
             </a:r>
             <a:r>
               <a:rPr lang="de-DE" dirty="0"/>
@@ -39710,7 +39378,7 @@
             </a:r>
             <a:r>
               <a:rPr lang="de-DE" dirty="0" err="1"/>
-              <a:t>letter</a:t>
+              <a:t>are</a:t>
             </a:r>
             <a:r>
               <a:rPr lang="de-DE" dirty="0"/>
@@ -39718,15 +39386,15 @@
             </a:r>
             <a:r>
               <a:rPr lang="de-DE" dirty="0" err="1"/>
-              <a:t>makes</a:t>
-            </a:r>
-            <a:r>
-              <a:rPr lang="de-DE" dirty="0"/>
-              <a:t> a </a:t>
+              <a:t>placed</a:t>
+            </a:r>
+            <a:r>
+              <a:rPr lang="de-DE" dirty="0"/>
+              <a:t> </a:t>
             </a:r>
             <a:r>
               <a:rPr lang="de-DE" dirty="0" err="1"/>
-              <a:t>property</a:t>
+              <a:t>side-by-side</a:t>
             </a:r>
             <a:r>
               <a:rPr lang="de-DE" dirty="0"/>
@@ -39734,34 +39402,115 @@
             </a:r>
             <a:r>
               <a:rPr lang="de-DE" dirty="0" err="1"/>
-              <a:t>package</a:t>
-            </a:r>
-            <a:r>
-              <a:rPr lang="de-DE" dirty="0"/>
-              <a:t> internal (</a:t>
+              <a:t>with</a:t>
+            </a:r>
+            <a:r>
+              <a:rPr lang="de-DE" dirty="0"/>
+              <a:t> code </a:t>
             </a:r>
             <a:r>
               <a:rPr lang="de-DE" dirty="0" err="1"/>
-              <a:t>reflection</a:t>
-            </a:r>
-            <a:r>
-              <a:rPr lang="de-DE" dirty="0"/>
-              <a:t> will not </a:t>
-            </a:r>
-            <a:r>
-              <a:rPr lang="de-DE" dirty="0" err="1"/>
-              <a:t>work</a:t>
-            </a:r>
-            <a:r>
-              <a:rPr lang="de-DE" dirty="0"/>
-              <a:t>, e.g. on tags)</a:t>
-            </a:r>
+              <a:t>files</a:t>
+            </a:r>
+            <a:endParaRPr lang="de-DE" dirty="0"/>
           </a:p>
           <a:p>
             <a:pPr lvl="1"/>
             <a:r>
+              <a:rPr lang="de-DE" dirty="0"/>
+              <a:t>simple </a:t>
+            </a:r>
+            <a:r>
               <a:rPr lang="de-DE" dirty="0" err="1"/>
-              <a:t>uppercase</a:t>
+              <a:t>naming</a:t>
+            </a:r>
+            <a:r>
+              <a:rPr lang="de-DE" dirty="0"/>
+              <a:t> </a:t>
+            </a:r>
+            <a:r>
+              <a:rPr lang="de-DE" dirty="0" err="1"/>
+              <a:t>convention</a:t>
+            </a:r>
+            <a:endParaRPr lang="de-DE" dirty="0"/>
+          </a:p>
+          <a:p>
+            <a:pPr lvl="2"/>
+            <a:r>
+              <a:rPr lang="de-DE" dirty="0"/>
+              <a:t>all </a:t>
+            </a:r>
+            <a:r>
+              <a:rPr lang="de-DE" dirty="0" err="1"/>
+              <a:t>files</a:t>
+            </a:r>
+            <a:r>
+              <a:rPr lang="de-DE" dirty="0"/>
+              <a:t> </a:t>
+            </a:r>
+            <a:r>
+              <a:rPr lang="de-DE" dirty="0" err="1"/>
+              <a:t>matching</a:t>
+            </a:r>
+            <a:r>
+              <a:rPr lang="de-DE" dirty="0"/>
+              <a:t> *_</a:t>
+            </a:r>
+            <a:r>
+              <a:rPr lang="de-DE" dirty="0" err="1"/>
+              <a:t>test.go</a:t>
+            </a:r>
+            <a:r>
+              <a:rPr lang="de-DE" dirty="0"/>
+              <a:t> </a:t>
+            </a:r>
+            <a:r>
+              <a:rPr lang="de-DE" dirty="0" err="1"/>
+              <a:t>are</a:t>
+            </a:r>
+            <a:r>
+              <a:rPr lang="de-DE" dirty="0"/>
+              <a:t> </a:t>
+            </a:r>
+            <a:r>
+              <a:rPr lang="de-DE" dirty="0" err="1"/>
+              <a:t>regarded</a:t>
+            </a:r>
+            <a:r>
+              <a:rPr lang="de-DE" dirty="0"/>
+              <a:t> </a:t>
+            </a:r>
+            <a:r>
+              <a:rPr lang="de-DE" dirty="0" err="1"/>
+              <a:t>as</a:t>
+            </a:r>
+            <a:r>
+              <a:rPr lang="de-DE" dirty="0"/>
+              <a:t> </a:t>
+            </a:r>
+            <a:r>
+              <a:rPr lang="de-DE" dirty="0" err="1"/>
+              <a:t>test</a:t>
+            </a:r>
+            <a:r>
+              <a:rPr lang="de-DE" dirty="0"/>
+              <a:t> </a:t>
+            </a:r>
+            <a:r>
+              <a:rPr lang="de-DE" dirty="0" err="1"/>
+              <a:t>files</a:t>
+            </a:r>
+            <a:endParaRPr lang="de-DE" dirty="0"/>
+          </a:p>
+          <a:p>
+            <a:pPr lvl="2"/>
+            <a:r>
+              <a:rPr lang="de-DE" dirty="0"/>
+              <a:t>all </a:t>
+            </a:r>
+            <a:r>
+              <a:rPr lang="de-DE" dirty="0" err="1"/>
+              <a:t>functions</a:t>
             </a:r>
             <a:r>
               <a:rPr lang="de-DE" dirty="0"/>
@@ -39777,7 +39526,15 @@
             </a:r>
             <a:r>
               <a:rPr lang="de-DE" dirty="0" err="1"/>
-              <a:t>letter</a:t>
+              <a:t>with</a:t>
+            </a:r>
+            <a:r>
+              <a:rPr lang="de-DE" dirty="0"/>
+              <a:t> Test… </a:t>
+            </a:r>
+            <a:r>
+              <a:rPr lang="de-DE" dirty="0" err="1"/>
+              <a:t>are</a:t>
             </a:r>
             <a:r>
               <a:rPr lang="de-DE" dirty="0"/>
@@ -39785,7 +39542,7 @@
             </a:r>
             <a:r>
               <a:rPr lang="de-DE" dirty="0" err="1"/>
-              <a:t>makes</a:t>
+              <a:t>regarded</a:t>
             </a:r>
             <a:r>
               <a:rPr lang="de-DE" dirty="0"/>
@@ -39793,34 +39550,187 @@
             </a:r>
             <a:r>
               <a:rPr lang="de-DE" dirty="0" err="1"/>
-              <a:t>property</a:t>
-            </a:r>
-            <a:r>
-              <a:rPr lang="de-DE" dirty="0"/>
-              <a:t> visible outside </a:t>
+              <a:t>as</a:t>
+            </a:r>
+            <a:r>
+              <a:rPr lang="de-DE" dirty="0"/>
+              <a:t> </a:t>
             </a:r>
             <a:r>
               <a:rPr lang="de-DE" dirty="0" err="1"/>
-              <a:t>package</a:t>
+              <a:t>test</a:t>
             </a:r>
             <a:r>
               <a:rPr lang="de-DE" dirty="0"/>
               <a:t> </a:t>
             </a:r>
+            <a:r>
+              <a:rPr lang="de-DE" dirty="0" err="1"/>
+              <a:t>cases</a:t>
+            </a:r>
+            <a:endParaRPr lang="de-DE" dirty="0"/>
           </a:p>
           <a:p>
             <a:pPr lvl="1"/>
             <a:r>
-              <a:rPr lang="de-DE" dirty="0"/>
-              <a:t>a </a:t>
-            </a:r>
-            <a:r>
               <a:rPr lang="de-DE" dirty="0" err="1"/>
-              <a:t>struct</a:t>
+              <a:t>each</a:t>
             </a:r>
             <a:r>
               <a:rPr lang="de-DE" dirty="0"/>
               <a:t> </a:t>
+            </a:r>
+            <a:r>
+              <a:rPr lang="de-DE" dirty="0" err="1"/>
+              <a:t>test</a:t>
+            </a:r>
+            <a:r>
+              <a:rPr lang="de-DE" dirty="0"/>
+              <a:t> </a:t>
+            </a:r>
+            <a:r>
+              <a:rPr lang="de-DE" dirty="0" err="1"/>
+              <a:t>case</a:t>
+            </a:r>
+            <a:r>
+              <a:rPr lang="de-DE" dirty="0"/>
+              <a:t> </a:t>
+            </a:r>
+            <a:r>
+              <a:rPr lang="de-DE" dirty="0" err="1"/>
+              <a:t>function</a:t>
+            </a:r>
+            <a:r>
+              <a:rPr lang="de-DE" dirty="0"/>
+              <a:t> </a:t>
+            </a:r>
+            <a:r>
+              <a:rPr lang="de-DE" dirty="0" err="1"/>
+              <a:t>receives</a:t>
+            </a:r>
+            <a:r>
+              <a:rPr lang="de-DE" dirty="0"/>
+              <a:t> a </a:t>
+            </a:r>
+            <a:r>
+              <a:rPr lang="de-DE" dirty="0" err="1"/>
+              <a:t>test</a:t>
+            </a:r>
+            <a:r>
+              <a:rPr lang="de-DE" dirty="0"/>
+              <a:t> </a:t>
+            </a:r>
+            <a:r>
+              <a:rPr lang="de-DE" dirty="0" err="1"/>
+              <a:t>context</a:t>
+            </a:r>
+            <a:r>
+              <a:rPr lang="de-DE" dirty="0"/>
+              <a:t> </a:t>
+            </a:r>
+            <a:r>
+              <a:rPr lang="de-DE" dirty="0" err="1"/>
+              <a:t>as</a:t>
+            </a:r>
+            <a:r>
+              <a:rPr lang="de-DE" dirty="0"/>
+              <a:t> </a:t>
+            </a:r>
+            <a:r>
+              <a:rPr lang="de-DE" dirty="0" err="1"/>
+              <a:t>parameter</a:t>
+            </a:r>
+            <a:endParaRPr lang="de-DE" dirty="0"/>
+          </a:p>
+          <a:p>
+            <a:pPr lvl="1"/>
+            <a:r>
+              <a:rPr lang="de-DE" dirty="0" err="1"/>
+              <a:t>test</a:t>
+            </a:r>
+            <a:r>
+              <a:rPr lang="de-DE" dirty="0"/>
+              <a:t> </a:t>
+            </a:r>
+            <a:r>
+              <a:rPr lang="de-DE" dirty="0" err="1"/>
+              <a:t>context</a:t>
+            </a:r>
+            <a:r>
+              <a:rPr lang="de-DE" dirty="0"/>
+              <a:t> </a:t>
+            </a:r>
+            <a:r>
+              <a:rPr lang="de-DE" dirty="0" err="1"/>
+              <a:t>can</a:t>
+            </a:r>
+            <a:r>
+              <a:rPr lang="de-DE" dirty="0"/>
+              <a:t> </a:t>
+            </a:r>
+            <a:r>
+              <a:rPr lang="de-DE" dirty="0" err="1"/>
+              <a:t>be</a:t>
+            </a:r>
+            <a:r>
+              <a:rPr lang="de-DE" dirty="0"/>
+              <a:t> </a:t>
+            </a:r>
+            <a:r>
+              <a:rPr lang="de-DE" dirty="0" err="1"/>
+              <a:t>used</a:t>
+            </a:r>
+            <a:r>
+              <a:rPr lang="de-DE" dirty="0"/>
+              <a:t> </a:t>
+            </a:r>
+            <a:r>
+              <a:rPr lang="de-DE" dirty="0" err="1"/>
+              <a:t>for</a:t>
+            </a:r>
+            <a:r>
+              <a:rPr lang="de-DE" dirty="0"/>
+              <a:t> </a:t>
+            </a:r>
+            <a:r>
+              <a:rPr lang="de-DE" dirty="0" err="1"/>
+              <a:t>logging</a:t>
+            </a:r>
+            <a:r>
+              <a:rPr lang="de-DE" dirty="0"/>
+              <a:t> </a:t>
+            </a:r>
+            <a:r>
+              <a:rPr lang="de-DE" dirty="0" err="1"/>
+              <a:t>or</a:t>
+            </a:r>
+            <a:r>
+              <a:rPr lang="de-DE" dirty="0"/>
+              <a:t> </a:t>
+            </a:r>
+            <a:r>
+              <a:rPr lang="de-DE" dirty="0" err="1"/>
+              <a:t>writing</a:t>
+            </a:r>
+            <a:r>
+              <a:rPr lang="de-DE" dirty="0"/>
+              <a:t> </a:t>
+            </a:r>
+            <a:r>
+              <a:rPr lang="de-DE" dirty="0" err="1"/>
+              <a:t>asserts</a:t>
+            </a:r>
+            <a:endParaRPr lang="de-DE" dirty="0"/>
+          </a:p>
+          <a:p>
+            <a:pPr lvl="1"/>
+            <a:r>
+              <a:rPr lang="de-DE" dirty="0" err="1"/>
+              <a:t>test</a:t>
+            </a:r>
+            <a:r>
+              <a:rPr lang="de-DE" dirty="0"/>
+              <a:t> code </a:t>
             </a:r>
             <a:r>
               <a:rPr lang="de-DE" dirty="0" err="1"/>
@@ -39828,11 +39738,19 @@
             </a:r>
             <a:r>
               <a:rPr lang="de-DE" dirty="0"/>
+              <a:t> not </a:t>
+            </a:r>
+            <a:r>
+              <a:rPr lang="de-DE" dirty="0" err="1"/>
+              <a:t>compiled</a:t>
+            </a:r>
+            <a:r>
+              <a:rPr lang="de-DE" dirty="0"/>
               <a:t> </a:t>
             </a:r>
             <a:r>
               <a:rPr lang="de-DE" dirty="0" err="1"/>
-              <a:t>very</a:t>
+              <a:t>into</a:t>
             </a:r>
             <a:r>
               <a:rPr lang="de-DE" dirty="0"/>
@@ -39840,7 +39758,7 @@
             </a:r>
             <a:r>
               <a:rPr lang="de-DE" dirty="0" err="1"/>
-              <a:t>similar</a:t>
+              <a:t>executable</a:t>
             </a:r>
             <a:r>
               <a:rPr lang="de-DE" dirty="0"/>
@@ -39848,72 +39766,12 @@
             </a:r>
             <a:r>
               <a:rPr lang="de-DE" dirty="0" err="1"/>
-              <a:t>to</a:t>
-            </a:r>
-            <a:r>
-              <a:rPr lang="de-DE" dirty="0"/>
-              <a:t> a C </a:t>
-            </a:r>
-            <a:r>
-              <a:rPr lang="de-DE" dirty="0" err="1"/>
-              <a:t>struct</a:t>
-            </a:r>
-            <a:r>
-              <a:rPr lang="de-DE" dirty="0"/>
-              <a:t>: </a:t>
-            </a:r>
-            <a:r>
-              <a:rPr lang="de-DE" dirty="0" err="1"/>
-              <a:t>memory</a:t>
-            </a:r>
-            <a:r>
-              <a:rPr lang="de-DE" dirty="0"/>
-              <a:t> block </a:t>
-            </a:r>
-            <a:r>
-              <a:rPr lang="de-DE" dirty="0" err="1"/>
-              <a:t>of</a:t>
-            </a:r>
-            <a:r>
-              <a:rPr lang="de-DE" dirty="0"/>
-              <a:t> </a:t>
-            </a:r>
-            <a:r>
-              <a:rPr lang="de-DE" dirty="0" err="1"/>
-              <a:t>fixed</a:t>
-            </a:r>
-            <a:r>
-              <a:rPr lang="de-DE" dirty="0"/>
-              <a:t> </a:t>
-            </a:r>
-            <a:r>
-              <a:rPr lang="de-DE" dirty="0" err="1"/>
-              <a:t>size</a:t>
-            </a:r>
-            <a:r>
-              <a:rPr lang="de-DE" dirty="0"/>
-              <a:t> </a:t>
-            </a:r>
-            <a:r>
-              <a:rPr lang="de-DE" dirty="0" err="1"/>
-              <a:t>with</a:t>
-            </a:r>
-            <a:r>
-              <a:rPr lang="de-DE" dirty="0"/>
-              <a:t> </a:t>
-            </a:r>
-            <a:r>
-              <a:rPr lang="de-DE" dirty="0" err="1"/>
-              <a:t>named</a:t>
-            </a:r>
-            <a:r>
-              <a:rPr lang="de-DE" dirty="0"/>
-              <a:t> </a:t>
-            </a:r>
-            <a:r>
-              <a:rPr lang="de-DE" dirty="0" err="1"/>
-              <a:t>fields</a:t>
-            </a:r>
+              <a:t>binaries</a:t>
+            </a:r>
+            <a:endParaRPr lang="de-DE" dirty="0"/>
+          </a:p>
+          <a:p>
+            <a:pPr lvl="1"/>
             <a:endParaRPr lang="de-DE" dirty="0"/>
           </a:p>
         </p:txBody>
@@ -39941,7 +39799,7 @@
           <a:p>
             <a:fld id="{43CE7C91-877C-44D6-9892-950E5E0626D1}" type="datetime1">
               <a:rPr lang="de-DE" smtClean="0"/>
-              <a:t>16.03.2021</a:t>
+              <a:t>29.03.2021</a:t>
             </a:fld>
             <a:endParaRPr lang="en-US" dirty="0"/>
           </a:p>
@@ -40054,20 +39912,50 @@
           <a:p>
             <a:r>
               <a:rPr lang="de-DE" dirty="0"/>
-              <a:t>Go </a:t>
+              <a:t>Go Unit </a:t>
             </a:r>
             <a:r>
               <a:rPr lang="de-DE" dirty="0" err="1"/>
-              <a:t>Structs</a:t>
+              <a:t>Testing</a:t>
             </a:r>
             <a:endParaRPr lang="de-DE" dirty="0"/>
           </a:p>
         </p:txBody>
       </p:sp>
+      <p:pic>
+        <p:nvPicPr>
+          <p:cNvPr id="8" name="Grafik 7">
+            <a:extLst>
+              <a:ext uri="{FF2B5EF4-FFF2-40B4-BE49-F238E27FC236}">
+                <a16:creationId xmlns:a16="http://schemas.microsoft.com/office/drawing/2014/main" id="{28481313-A05D-4A33-888C-3B769C8AAEDD}"/>
+              </a:ext>
+            </a:extLst>
+          </p:cNvPr>
+          <p:cNvPicPr>
+            <a:picLocks noChangeAspect="1"/>
+          </p:cNvPicPr>
+          <p:nvPr/>
+        </p:nvPicPr>
+        <p:blipFill>
+          <a:blip r:embed="rId2"/>
+          <a:stretch>
+            <a:fillRect/>
+          </a:stretch>
+        </p:blipFill>
+        <p:spPr>
+          <a:xfrm>
+            <a:off x="6531288" y="1614490"/>
+            <a:ext cx="3486150" cy="4191000"/>
+          </a:xfrm>
+          <a:prstGeom prst="rect">
+            <a:avLst/>
+          </a:prstGeom>
+        </p:spPr>
+      </p:pic>
     </p:spTree>
     <p:extLst>
       <p:ext uri="{BB962C8B-B14F-4D97-AF65-F5344CB8AC3E}">
-        <p14:creationId xmlns:p14="http://schemas.microsoft.com/office/powerpoint/2010/main" val="2700646792"/>
+        <p14:creationId xmlns:p14="http://schemas.microsoft.com/office/powerpoint/2010/main" val="2163039191"/>
       </p:ext>
     </p:extLst>
   </p:cSld>
@@ -41081,24 +40969,6 @@
 </file>
 
 <file path=customXml/item1.xml><?xml version="1.0" encoding="utf-8"?>
-<?mso-contentType ?>
-<FormTemplates xmlns="http://schemas.microsoft.com/sharepoint/v3/contenttype/forms">
-  <Display>DocumentLibraryForm</Display>
-  <Edit>DocumentLibraryForm</Edit>
-  <New>DocumentLibraryForm</New>
-</FormTemplates>
-</file>
-
-<file path=customXml/item2.xml><?xml version="1.0" encoding="utf-8"?>
-<p:properties xmlns:p="http://schemas.microsoft.com/office/2006/metadata/properties" xmlns:xsi="http://www.w3.org/2001/XMLSchema-instance" xmlns:pc="http://schemas.microsoft.com/office/infopath/2007/PartnerControls">
-  <documentManagement>
-    <_Version xmlns="http://schemas.microsoft.com/sharepoint/v3/fields" xsi:nil="true"/>
-    <_Status xmlns="http://schemas.microsoft.com/sharepoint/v3/fields">Not Started</_Status>
-  </documentManagement>
-</p:properties>
-</file>
-
-<file path=customXml/item3.xml><?xml version="1.0" encoding="utf-8"?>
 <ct:contentTypeSchema xmlns:ct="http://schemas.microsoft.com/office/2006/metadata/contentType" xmlns:ma="http://schemas.microsoft.com/office/2006/metadata/properties/metaAttributes" ct:_="" ma:_="" ma:contentTypeName="Document" ma:contentTypeID="0x0101000DE64AEEDD9B7A4D93545ACBE97D4615" ma:contentTypeVersion="2" ma:contentTypeDescription="Create a new document." ma:contentTypeScope="" ma:versionID="f49002b78e3a4a71b814eef46a983816">
   <xsd:schema xmlns:xsd="http://www.w3.org/2001/XMLSchema" xmlns:xs="http://www.w3.org/2001/XMLSchema" xmlns:p="http://schemas.microsoft.com/office/2006/metadata/properties" xmlns:ns2="http://schemas.microsoft.com/sharepoint/v3/fields" targetNamespace="http://schemas.microsoft.com/office/2006/metadata/properties" ma:root="true" ma:fieldsID="38f6db2dd0d9a0cf6a8dc37be32b365b" ns2:_="">
     <xsd:import namespace="http://schemas.microsoft.com/sharepoint/v3/fields"/>
@@ -41242,10 +41112,38 @@
 </ct:contentTypeSchema>
 </file>
 
+<file path=customXml/item2.xml><?xml version="1.0" encoding="utf-8"?>
+<p:properties xmlns:p="http://schemas.microsoft.com/office/2006/metadata/properties" xmlns:xsi="http://www.w3.org/2001/XMLSchema-instance" xmlns:pc="http://schemas.microsoft.com/office/infopath/2007/PartnerControls">
+  <documentManagement>
+    <_Version xmlns="http://schemas.microsoft.com/sharepoint/v3/fields" xsi:nil="true"/>
+    <_Status xmlns="http://schemas.microsoft.com/sharepoint/v3/fields">Not Started</_Status>
+  </documentManagement>
+</p:properties>
+</file>
+
+<file path=customXml/item3.xml><?xml version="1.0" encoding="utf-8"?>
+<?mso-contentType ?>
+<FormTemplates xmlns="http://schemas.microsoft.com/sharepoint/v3/contenttype/forms">
+  <Display>DocumentLibraryForm</Display>
+  <Edit>DocumentLibraryForm</Edit>
+  <New>DocumentLibraryForm</New>
+</FormTemplates>
+</file>
+
 <file path=customXml/itemProps1.xml><?xml version="1.0" encoding="utf-8"?>
-<ds:datastoreItem xmlns:ds="http://schemas.openxmlformats.org/officeDocument/2006/customXml" ds:itemID="{87D2A1B0-FF3E-4009-940D-AED0EB70AA20}">
+<ds:datastoreItem xmlns:ds="http://schemas.openxmlformats.org/officeDocument/2006/customXml" ds:itemID="{E4214858-785C-42F7-BE66-6D0E79395FC8}">
   <ds:schemaRefs>
-    <ds:schemaRef ds:uri="http://schemas.microsoft.com/sharepoint/v3/contenttype/forms"/>
+    <ds:schemaRef ds:uri="http://schemas.microsoft.com/office/2006/metadata/contentType"/>
+    <ds:schemaRef ds:uri="http://schemas.microsoft.com/office/2006/metadata/properties/metaAttributes"/>
+    <ds:schemaRef ds:uri="http://www.w3.org/2001/XMLSchema"/>
+    <ds:schemaRef ds:uri="http://schemas.microsoft.com/office/2006/metadata/properties"/>
+    <ds:schemaRef ds:uri="http://schemas.microsoft.com/sharepoint/v3/fields"/>
+    <ds:schemaRef ds:uri="http://schemas.microsoft.com/office/2006/documentManagement/types"/>
+    <ds:schemaRef ds:uri="http://schemas.microsoft.com/office/infopath/2007/PartnerControls"/>
+    <ds:schemaRef ds:uri="http://schemas.openxmlformats.org/package/2006/metadata/core-properties"/>
+    <ds:schemaRef ds:uri="http://purl.org/dc/elements/1.1/"/>
+    <ds:schemaRef ds:uri="http://purl.org/dc/terms/"/>
+    <ds:schemaRef ds:uri="http://schemas.microsoft.com/internal/obd"/>
   </ds:schemaRefs>
 </ds:datastoreItem>
 </file>
@@ -41267,19 +41165,9 @@
 </file>
 
 <file path=customXml/itemProps3.xml><?xml version="1.0" encoding="utf-8"?>
-<ds:datastoreItem xmlns:ds="http://schemas.openxmlformats.org/officeDocument/2006/customXml" ds:itemID="{E4214858-785C-42F7-BE66-6D0E79395FC8}">
+<ds:datastoreItem xmlns:ds="http://schemas.openxmlformats.org/officeDocument/2006/customXml" ds:itemID="{87D2A1B0-FF3E-4009-940D-AED0EB70AA20}">
   <ds:schemaRefs>
-    <ds:schemaRef ds:uri="http://schemas.microsoft.com/office/2006/metadata/contentType"/>
-    <ds:schemaRef ds:uri="http://schemas.microsoft.com/office/2006/metadata/properties/metaAttributes"/>
-    <ds:schemaRef ds:uri="http://www.w3.org/2001/XMLSchema"/>
-    <ds:schemaRef ds:uri="http://schemas.microsoft.com/office/2006/metadata/properties"/>
-    <ds:schemaRef ds:uri="http://schemas.microsoft.com/sharepoint/v3/fields"/>
-    <ds:schemaRef ds:uri="http://schemas.microsoft.com/office/2006/documentManagement/types"/>
-    <ds:schemaRef ds:uri="http://schemas.microsoft.com/office/infopath/2007/PartnerControls"/>
-    <ds:schemaRef ds:uri="http://schemas.openxmlformats.org/package/2006/metadata/core-properties"/>
-    <ds:schemaRef ds:uri="http://purl.org/dc/elements/1.1/"/>
-    <ds:schemaRef ds:uri="http://purl.org/dc/terms/"/>
-    <ds:schemaRef ds:uri="http://schemas.microsoft.com/internal/obd"/>
+    <ds:schemaRef ds:uri="http://schemas.microsoft.com/sharepoint/v3/contenttype/forms"/>
   </ds:schemaRefs>
 </ds:datastoreItem>
 </file>
</xml_diff>